<commit_message>
updated GPS Distance to be more focused on problem solving.
</commit_message>
<xml_diff>
--- a/Slides/On-Campus/07_01_DesignContinuedStringsLife.pptx
+++ b/Slides/On-Campus/07_01_DesignContinuedStringsLife.pptx
@@ -5,24 +5,26 @@
     <p:sldMasterId id="2147483648" r:id="rId1"/>
   </p:sldMasterIdLst>
   <p:notesMasterIdLst>
-    <p:notesMasterId r:id="rId14"/>
+    <p:notesMasterId r:id="rId16"/>
   </p:notesMasterIdLst>
   <p:handoutMasterIdLst>
-    <p:handoutMasterId r:id="rId15"/>
+    <p:handoutMasterId r:id="rId17"/>
   </p:handoutMasterIdLst>
   <p:sldIdLst>
     <p:sldId id="256" r:id="rId2"/>
-    <p:sldId id="263" r:id="rId3"/>
-    <p:sldId id="264" r:id="rId4"/>
-    <p:sldId id="269" r:id="rId5"/>
-    <p:sldId id="265" r:id="rId6"/>
-    <p:sldId id="266" r:id="rId7"/>
-    <p:sldId id="267" r:id="rId8"/>
-    <p:sldId id="257" r:id="rId9"/>
-    <p:sldId id="258" r:id="rId10"/>
-    <p:sldId id="259" r:id="rId11"/>
+    <p:sldId id="274" r:id="rId3"/>
+    <p:sldId id="263" r:id="rId4"/>
+    <p:sldId id="264" r:id="rId5"/>
+    <p:sldId id="269" r:id="rId6"/>
+    <p:sldId id="265" r:id="rId7"/>
+    <p:sldId id="266" r:id="rId8"/>
+    <p:sldId id="267" r:id="rId9"/>
+    <p:sldId id="257" r:id="rId10"/>
+    <p:sldId id="258" r:id="rId11"/>
     <p:sldId id="260" r:id="rId12"/>
-    <p:sldId id="261" r:id="rId13"/>
+    <p:sldId id="259" r:id="rId13"/>
+    <p:sldId id="270" r:id="rId14"/>
+    <p:sldId id="261" r:id="rId15"/>
   </p:sldIdLst>
   <p:sldSz cx="13817600" cy="7772400"/>
   <p:notesSz cx="6858000" cy="9144000"/>
@@ -225,7 +227,7 @@
           <a:p>
             <a:fld id="{4D7E51A5-B478-1E40-8CBB-0DAA8831E99D}" type="datetimeFigureOut">
               <a:rPr lang="en-US" smtClean="0"/>
-              <a:t>9/22/2021</a:t>
+              <a:t>10/4/2021</a:t>
             </a:fld>
             <a:endParaRPr lang="en-US"/>
           </a:p>
@@ -417,7 +419,7 @@
           <a:p>
             <a:fld id="{D0ED587F-861E-6740-9643-E3DDAE89B8D6}" type="datetimeFigureOut">
               <a:rPr lang="en-US" smtClean="0"/>
-              <a:t>9/22/2021</a:t>
+              <a:t>10/4/2021</a:t>
             </a:fld>
             <a:endParaRPr lang="en-US"/>
           </a:p>
@@ -8655,6 +8657,642 @@
 </file>
 
 <file path=ppt/slides/slide10.xml><?xml version="1.0" encoding="utf-8"?>
+<p:sld xmlns:a="http://schemas.openxmlformats.org/drawingml/2006/main" xmlns:r="http://schemas.openxmlformats.org/officeDocument/2006/relationships" xmlns:p="http://schemas.openxmlformats.org/presentationml/2006/main">
+  <p:cSld>
+    <p:spTree>
+      <p:nvGrpSpPr>
+        <p:cNvPr id="1" name=""/>
+        <p:cNvGrpSpPr/>
+        <p:nvPr/>
+      </p:nvGrpSpPr>
+      <p:grpSpPr>
+        <a:xfrm>
+          <a:off x="0" y="0"/>
+          <a:ext cx="0" cy="0"/>
+          <a:chOff x="0" y="0"/>
+          <a:chExt cx="0" cy="0"/>
+        </a:xfrm>
+      </p:grpSpPr>
+      <p:sp>
+        <p:nvSpPr>
+          <p:cNvPr id="2" name="Title 1">
+            <a:extLst>
+              <a:ext uri="{FF2B5EF4-FFF2-40B4-BE49-F238E27FC236}">
+                <a16:creationId xmlns:a16="http://schemas.microsoft.com/office/drawing/2014/main" id="{A4B75936-9751-C742-8F6C-BCAFDBE31A0D}"/>
+              </a:ext>
+            </a:extLst>
+          </p:cNvPr>
+          <p:cNvSpPr>
+            <a:spLocks noGrp="1"/>
+          </p:cNvSpPr>
+          <p:nvPr>
+            <p:ph type="title"/>
+          </p:nvPr>
+        </p:nvSpPr>
+        <p:spPr/>
+        <p:txBody>
+          <a:bodyPr/>
+          <a:lstStyle/>
+          <a:p>
+            <a:r>
+              <a:rPr lang="en-US" dirty="0"/>
+              <a:t>String Methods</a:t>
+            </a:r>
+          </a:p>
+        </p:txBody>
+      </p:sp>
+      <p:sp>
+        <p:nvSpPr>
+          <p:cNvPr id="3" name="Text Placeholder 2">
+            <a:extLst>
+              <a:ext uri="{FF2B5EF4-FFF2-40B4-BE49-F238E27FC236}">
+                <a16:creationId xmlns:a16="http://schemas.microsoft.com/office/drawing/2014/main" id="{FCBE4F2A-25A2-374F-9179-7E17A4F72019}"/>
+              </a:ext>
+            </a:extLst>
+          </p:cNvPr>
+          <p:cNvSpPr>
+            <a:spLocks noGrp="1"/>
+          </p:cNvSpPr>
+          <p:nvPr>
+            <p:ph type="body" sz="quarter" idx="10"/>
+          </p:nvPr>
+        </p:nvSpPr>
+        <p:spPr>
+          <a:xfrm>
+            <a:off x="677337" y="1675083"/>
+            <a:ext cx="6558842" cy="4888774"/>
+          </a:xfrm>
+        </p:spPr>
+        <p:txBody>
+          <a:bodyPr/>
+          <a:lstStyle/>
+          <a:p>
+            <a:r>
+              <a:rPr lang="en-US" dirty="0"/>
+              <a:t>replace(old, new)</a:t>
+            </a:r>
+          </a:p>
+          <a:p>
+            <a:pPr lvl="1"/>
+            <a:r>
+              <a:rPr lang="en-US" dirty="0"/>
+              <a:t>replace(old, new, count)</a:t>
+            </a:r>
+          </a:p>
+          <a:p>
+            <a:r>
+              <a:rPr lang="en-US" dirty="0"/>
+              <a:t>find(x) </a:t>
+            </a:r>
+          </a:p>
+          <a:p>
+            <a:pPr lvl="1"/>
+            <a:r>
+              <a:rPr lang="en-US" dirty="0"/>
+              <a:t>find(x, start)</a:t>
+            </a:r>
+          </a:p>
+          <a:p>
+            <a:pPr lvl="1"/>
+            <a:r>
+              <a:rPr lang="en-US" dirty="0"/>
+              <a:t>find(x, start, end)</a:t>
+            </a:r>
+          </a:p>
+          <a:p>
+            <a:pPr lvl="1"/>
+            <a:r>
+              <a:rPr lang="en-US" dirty="0" err="1"/>
+              <a:t>rfind</a:t>
+            </a:r>
+            <a:r>
+              <a:rPr lang="en-US" dirty="0"/>
+              <a:t>(x)</a:t>
+            </a:r>
+          </a:p>
+          <a:p>
+            <a:r>
+              <a:rPr lang="en-US" dirty="0"/>
+              <a:t>count(x) </a:t>
+            </a:r>
+          </a:p>
+          <a:p>
+            <a:r>
+              <a:rPr lang="en-US" dirty="0" err="1"/>
+              <a:t>isalnum</a:t>
+            </a:r>
+            <a:r>
+              <a:rPr lang="en-US" dirty="0"/>
+              <a:t>()  - no specials  or </a:t>
+            </a:r>
+            <a:r>
+              <a:rPr lang="en-US" dirty="0" err="1"/>
+              <a:t>puncuation</a:t>
+            </a:r>
+            <a:endParaRPr lang="en-US" dirty="0"/>
+          </a:p>
+          <a:p>
+            <a:r>
+              <a:rPr lang="en-US" dirty="0"/>
+              <a:t>lower() – change all to lowercase</a:t>
+            </a:r>
+          </a:p>
+          <a:p>
+            <a:r>
+              <a:rPr lang="en-US" dirty="0"/>
+              <a:t>upper() – change all to uppercase</a:t>
+            </a:r>
+          </a:p>
+          <a:p>
+            <a:r>
+              <a:rPr lang="en-US" dirty="0"/>
+              <a:t>strip() – remove training and leading spaces</a:t>
+            </a:r>
+          </a:p>
+        </p:txBody>
+      </p:sp>
+      <p:sp>
+        <p:nvSpPr>
+          <p:cNvPr id="4" name="Text Placeholder 2">
+            <a:extLst>
+              <a:ext uri="{FF2B5EF4-FFF2-40B4-BE49-F238E27FC236}">
+                <a16:creationId xmlns:a16="http://schemas.microsoft.com/office/drawing/2014/main" id="{5DCC2943-EF66-6848-8EA9-A601B82ECB82}"/>
+              </a:ext>
+            </a:extLst>
+          </p:cNvPr>
+          <p:cNvSpPr txBox="1">
+            <a:spLocks/>
+          </p:cNvSpPr>
+          <p:nvPr/>
+        </p:nvSpPr>
+        <p:spPr>
+          <a:xfrm>
+            <a:off x="7236179" y="1463722"/>
+            <a:ext cx="5953346" cy="2316596"/>
+          </a:xfrm>
+          <a:prstGeom prst="rect">
+            <a:avLst/>
+          </a:prstGeom>
+        </p:spPr>
+        <p:txBody>
+          <a:bodyPr vert="horz" wrap="square" lIns="91440" tIns="91440" rIns="91440" bIns="91440" rtlCol="0">
+            <a:spAutoFit/>
+          </a:bodyPr>
+          <a:lstStyle>
+            <a:lvl1pPr marL="524712" indent="-524712" algn="l" defTabSz="699614" rtl="0" eaLnBrk="1" latinLnBrk="0" hangingPunct="1">
+              <a:lnSpc>
+                <a:spcPct val="120000"/>
+              </a:lnSpc>
+              <a:spcBef>
+                <a:spcPts val="600"/>
+              </a:spcBef>
+              <a:spcAft>
+                <a:spcPts val="600"/>
+              </a:spcAft>
+              <a:buFont typeface="Arial"/>
+              <a:buChar char="•"/>
+              <a:defRPr sz="1800" b="0" i="0" kern="1200">
+                <a:solidFill>
+                  <a:srgbClr val="092529"/>
+                </a:solidFill>
+                <a:latin typeface="Proxima Nova" charset="0"/>
+                <a:ea typeface="Proxima Nova" charset="0"/>
+                <a:cs typeface="Proxima Nova" charset="0"/>
+              </a:defRPr>
+            </a:lvl1pPr>
+            <a:lvl2pPr marL="1136875" indent="-437261" algn="l" defTabSz="699614" rtl="0" eaLnBrk="1" latinLnBrk="0" hangingPunct="1">
+              <a:lnSpc>
+                <a:spcPct val="120000"/>
+              </a:lnSpc>
+              <a:spcBef>
+                <a:spcPts val="0"/>
+              </a:spcBef>
+              <a:spcAft>
+                <a:spcPts val="600"/>
+              </a:spcAft>
+              <a:buFont typeface="Arial"/>
+              <a:buChar char="–"/>
+              <a:defRPr sz="1600" b="0" i="0" kern="1200">
+                <a:solidFill>
+                  <a:srgbClr val="092529"/>
+                </a:solidFill>
+                <a:latin typeface="Proxima Nova" charset="0"/>
+                <a:ea typeface="Proxima Nova" charset="0"/>
+                <a:cs typeface="Proxima Nova" charset="0"/>
+              </a:defRPr>
+            </a:lvl2pPr>
+            <a:lvl3pPr marL="1749040" indent="-349807" algn="l" defTabSz="699614" rtl="0" eaLnBrk="1" latinLnBrk="0" hangingPunct="1">
+              <a:lnSpc>
+                <a:spcPct val="120000"/>
+              </a:lnSpc>
+              <a:spcBef>
+                <a:spcPts val="0"/>
+              </a:spcBef>
+              <a:spcAft>
+                <a:spcPts val="600"/>
+              </a:spcAft>
+              <a:buFont typeface="Arial"/>
+              <a:buChar char="•"/>
+              <a:defRPr sz="1600" b="0" i="0" kern="1200">
+                <a:solidFill>
+                  <a:srgbClr val="092529"/>
+                </a:solidFill>
+                <a:latin typeface="Proxima Nova" charset="0"/>
+                <a:ea typeface="Proxima Nova" charset="0"/>
+                <a:cs typeface="Proxima Nova" charset="0"/>
+              </a:defRPr>
+            </a:lvl3pPr>
+            <a:lvl4pPr marL="2448655" indent="-349807" algn="l" defTabSz="699614" rtl="0" eaLnBrk="1" latinLnBrk="0" hangingPunct="1">
+              <a:lnSpc>
+                <a:spcPct val="120000"/>
+              </a:lnSpc>
+              <a:spcBef>
+                <a:spcPts val="0"/>
+              </a:spcBef>
+              <a:spcAft>
+                <a:spcPts val="600"/>
+              </a:spcAft>
+              <a:buFont typeface="Arial"/>
+              <a:buChar char="–"/>
+              <a:defRPr sz="1600" b="0" i="0" kern="1200">
+                <a:solidFill>
+                  <a:srgbClr val="092529"/>
+                </a:solidFill>
+                <a:latin typeface="Proxima Nova" charset="0"/>
+                <a:ea typeface="Proxima Nova" charset="0"/>
+                <a:cs typeface="Proxima Nova" charset="0"/>
+              </a:defRPr>
+            </a:lvl4pPr>
+            <a:lvl5pPr marL="3148272" indent="-349807" algn="l" defTabSz="699614" rtl="0" eaLnBrk="1" latinLnBrk="0" hangingPunct="1">
+              <a:spcBef>
+                <a:spcPct val="20000"/>
+              </a:spcBef>
+              <a:buFont typeface="Arial"/>
+              <a:buChar char="»"/>
+              <a:defRPr sz="1648" b="0" kern="1200">
+                <a:solidFill>
+                  <a:srgbClr val="092529"/>
+                </a:solidFill>
+                <a:latin typeface="Franklin Gothic Book" charset="0"/>
+                <a:ea typeface="Franklin Gothic Book" charset="0"/>
+                <a:cs typeface="Franklin Gothic Book" charset="0"/>
+              </a:defRPr>
+            </a:lvl5pPr>
+            <a:lvl6pPr marL="3847888" indent="-349807" algn="l" defTabSz="699614" rtl="0" eaLnBrk="1" latinLnBrk="0" hangingPunct="1">
+              <a:spcBef>
+                <a:spcPct val="20000"/>
+              </a:spcBef>
+              <a:buFont typeface="Arial"/>
+              <a:buChar char="•"/>
+              <a:defRPr sz="3022" kern="1200">
+                <a:solidFill>
+                  <a:schemeClr val="tx1"/>
+                </a:solidFill>
+                <a:latin typeface="+mn-lt"/>
+                <a:ea typeface="+mn-ea"/>
+                <a:cs typeface="+mn-cs"/>
+              </a:defRPr>
+            </a:lvl6pPr>
+            <a:lvl7pPr marL="4547505" indent="-349807" algn="l" defTabSz="699614" rtl="0" eaLnBrk="1" latinLnBrk="0" hangingPunct="1">
+              <a:spcBef>
+                <a:spcPct val="20000"/>
+              </a:spcBef>
+              <a:buFont typeface="Arial"/>
+              <a:buChar char="•"/>
+              <a:defRPr sz="3022" kern="1200">
+                <a:solidFill>
+                  <a:schemeClr val="tx1"/>
+                </a:solidFill>
+                <a:latin typeface="+mn-lt"/>
+                <a:ea typeface="+mn-ea"/>
+                <a:cs typeface="+mn-cs"/>
+              </a:defRPr>
+            </a:lvl7pPr>
+            <a:lvl8pPr marL="5247119" indent="-349807" algn="l" defTabSz="699614" rtl="0" eaLnBrk="1" latinLnBrk="0" hangingPunct="1">
+              <a:spcBef>
+                <a:spcPct val="20000"/>
+              </a:spcBef>
+              <a:buFont typeface="Arial"/>
+              <a:buChar char="•"/>
+              <a:defRPr sz="3022" kern="1200">
+                <a:solidFill>
+                  <a:schemeClr val="tx1"/>
+                </a:solidFill>
+                <a:latin typeface="+mn-lt"/>
+                <a:ea typeface="+mn-ea"/>
+                <a:cs typeface="+mn-cs"/>
+              </a:defRPr>
+            </a:lvl8pPr>
+            <a:lvl9pPr marL="5946736" indent="-349807" algn="l" defTabSz="699614" rtl="0" eaLnBrk="1" latinLnBrk="0" hangingPunct="1">
+              <a:spcBef>
+                <a:spcPct val="20000"/>
+              </a:spcBef>
+              <a:buFont typeface="Arial"/>
+              <a:buChar char="•"/>
+              <a:defRPr sz="3022" kern="1200">
+                <a:solidFill>
+                  <a:schemeClr val="tx1"/>
+                </a:solidFill>
+                <a:latin typeface="+mn-lt"/>
+                <a:ea typeface="+mn-ea"/>
+                <a:cs typeface="+mn-cs"/>
+              </a:defRPr>
+            </a:lvl9pPr>
+          </a:lstStyle>
+          <a:p>
+            <a:pPr marL="0" indent="0">
+              <a:buNone/>
+            </a:pPr>
+            <a:r>
+              <a:rPr lang="en-US" dirty="0"/>
+              <a:t>Conditional Operators and Strings</a:t>
+            </a:r>
+          </a:p>
+          <a:p>
+            <a:r>
+              <a:rPr lang="en-US" dirty="0"/>
+              <a:t>== - both are equal –  including case</a:t>
+            </a:r>
+          </a:p>
+          <a:p>
+            <a:r>
+              <a:rPr lang="en-US" dirty="0"/>
+              <a:t>&gt; - letter by letter comparison</a:t>
+            </a:r>
+          </a:p>
+          <a:p>
+            <a:r>
+              <a:rPr lang="en-US" dirty="0"/>
+              <a:t>string </a:t>
+            </a:r>
+            <a:r>
+              <a:rPr lang="en-US" b="1" dirty="0"/>
+              <a:t>in</a:t>
+            </a:r>
+            <a:r>
+              <a:rPr lang="en-US" dirty="0"/>
+              <a:t> string – in operator </a:t>
+            </a:r>
+          </a:p>
+          <a:p>
+            <a:pPr lvl="1"/>
+            <a:r>
+              <a:rPr lang="en-US" dirty="0"/>
+              <a:t>works with lists/tuples </a:t>
+            </a:r>
+          </a:p>
+        </p:txBody>
+      </p:sp>
+    </p:spTree>
+    <p:extLst>
+      <p:ext uri="{BB962C8B-B14F-4D97-AF65-F5344CB8AC3E}">
+        <p14:creationId xmlns:p14="http://schemas.microsoft.com/office/powerpoint/2010/main" val="316372104"/>
+      </p:ext>
+    </p:extLst>
+  </p:cSld>
+  <p:clrMapOvr>
+    <a:masterClrMapping/>
+  </p:clrMapOvr>
+  <mc:AlternateContent xmlns:mc="http://schemas.openxmlformats.org/markup-compatibility/2006" xmlns:p14="http://schemas.microsoft.com/office/powerpoint/2010/main">
+    <mc:Choice Requires="p14">
+      <p:transition p14:dur="300">
+        <p:fade/>
+      </p:transition>
+    </mc:Choice>
+    <mc:Fallback xmlns="">
+      <p:transition>
+        <p:fade/>
+      </p:transition>
+    </mc:Fallback>
+  </mc:AlternateContent>
+</p:sld>
+</file>
+
+<file path=ppt/slides/slide11.xml><?xml version="1.0" encoding="utf-8"?>
+<p:sld xmlns:a="http://schemas.openxmlformats.org/drawingml/2006/main" xmlns:r="http://schemas.openxmlformats.org/officeDocument/2006/relationships" xmlns:p="http://schemas.openxmlformats.org/presentationml/2006/main">
+  <p:cSld>
+    <p:spTree>
+      <p:nvGrpSpPr>
+        <p:cNvPr id="1" name=""/>
+        <p:cNvGrpSpPr/>
+        <p:nvPr/>
+      </p:nvGrpSpPr>
+      <p:grpSpPr>
+        <a:xfrm>
+          <a:off x="0" y="0"/>
+          <a:ext cx="0" cy="0"/>
+          <a:chOff x="0" y="0"/>
+          <a:chExt cx="0" cy="0"/>
+        </a:xfrm>
+      </p:grpSpPr>
+      <p:sp>
+        <p:nvSpPr>
+          <p:cNvPr id="2" name="Title 1">
+            <a:extLst>
+              <a:ext uri="{FF2B5EF4-FFF2-40B4-BE49-F238E27FC236}">
+                <a16:creationId xmlns:a16="http://schemas.microsoft.com/office/drawing/2014/main" id="{560D7DB4-EFD8-4C4F-B554-9867192F8BB3}"/>
+              </a:ext>
+            </a:extLst>
+          </p:cNvPr>
+          <p:cNvSpPr>
+            <a:spLocks noGrp="1"/>
+          </p:cNvSpPr>
+          <p:nvPr>
+            <p:ph type="title"/>
+          </p:nvPr>
+        </p:nvSpPr>
+        <p:spPr/>
+        <p:txBody>
+          <a:bodyPr/>
+          <a:lstStyle/>
+          <a:p>
+            <a:r>
+              <a:rPr lang="en-US" dirty="0"/>
+              <a:t>Split and Join</a:t>
+            </a:r>
+          </a:p>
+        </p:txBody>
+      </p:sp>
+      <p:sp>
+        <p:nvSpPr>
+          <p:cNvPr id="3" name="Text Placeholder 2">
+            <a:extLst>
+              <a:ext uri="{FF2B5EF4-FFF2-40B4-BE49-F238E27FC236}">
+                <a16:creationId xmlns:a16="http://schemas.microsoft.com/office/drawing/2014/main" id="{1AF94B93-29DC-2E47-904F-29D20F25F1BB}"/>
+              </a:ext>
+            </a:extLst>
+          </p:cNvPr>
+          <p:cNvSpPr>
+            <a:spLocks noGrp="1"/>
+          </p:cNvSpPr>
+          <p:nvPr>
+            <p:ph type="body" sz="quarter" idx="10"/>
+          </p:nvPr>
+        </p:nvSpPr>
+        <p:spPr>
+          <a:xfrm>
+            <a:off x="628075" y="1776683"/>
+            <a:ext cx="9290625" cy="2810898"/>
+          </a:xfrm>
+        </p:spPr>
+        <p:txBody>
+          <a:bodyPr/>
+          <a:lstStyle/>
+          <a:p>
+            <a:r>
+              <a:rPr lang="en-US" dirty="0"/>
+              <a:t>split – converts a string into list of strings</a:t>
+            </a:r>
+          </a:p>
+          <a:p>
+            <a:pPr lvl="1"/>
+            <a:r>
+              <a:rPr lang="en-US" dirty="0"/>
+              <a:t>split on the string passed into it!</a:t>
+            </a:r>
+          </a:p>
+          <a:p>
+            <a:pPr marL="0" indent="0">
+              <a:buNone/>
+            </a:pPr>
+            <a:r>
+              <a:rPr lang="en-US" dirty="0">
+                <a:latin typeface="Consolas" panose="020B0609020204030204" pitchFamily="49" charset="0"/>
+                <a:cs typeface="Consolas" panose="020B0609020204030204" pitchFamily="49" charset="0"/>
+              </a:rPr>
+              <a:t>csv = </a:t>
+            </a:r>
+            <a:r>
+              <a:rPr lang="en-US" dirty="0">
+                <a:solidFill>
+                  <a:srgbClr val="6A8759"/>
+                </a:solidFill>
+                <a:latin typeface="Consolas" panose="020B0609020204030204" pitchFamily="49" charset="0"/>
+                <a:cs typeface="Consolas" panose="020B0609020204030204" pitchFamily="49" charset="0"/>
+              </a:rPr>
+              <a:t>"skeleton,13,12,20"</a:t>
+            </a:r>
+            <a:r>
+              <a:rPr lang="en-US" dirty="0">
+                <a:latin typeface="Consolas" panose="020B0609020204030204" pitchFamily="49" charset="0"/>
+                <a:cs typeface="Consolas" panose="020B0609020204030204" pitchFamily="49" charset="0"/>
+              </a:rPr>
+              <a:t>.split(</a:t>
+            </a:r>
+            <a:r>
+              <a:rPr lang="en-US" dirty="0">
+                <a:solidFill>
+                  <a:srgbClr val="6A8759"/>
+                </a:solidFill>
+                <a:latin typeface="Consolas" panose="020B0609020204030204" pitchFamily="49" charset="0"/>
+                <a:cs typeface="Consolas" panose="020B0609020204030204" pitchFamily="49" charset="0"/>
+              </a:rPr>
+              <a:t>","</a:t>
+            </a:r>
+            <a:r>
+              <a:rPr lang="en-US" dirty="0">
+                <a:latin typeface="Consolas" panose="020B0609020204030204" pitchFamily="49" charset="0"/>
+                <a:cs typeface="Consolas" panose="020B0609020204030204" pitchFamily="49" charset="0"/>
+              </a:rPr>
+              <a:t>) </a:t>
+            </a:r>
+            <a:r>
+              <a:rPr lang="en-US" dirty="0">
+                <a:solidFill>
+                  <a:srgbClr val="808080"/>
+                </a:solidFill>
+                <a:latin typeface="Consolas" panose="020B0609020204030204" pitchFamily="49" charset="0"/>
+                <a:cs typeface="Consolas" panose="020B0609020204030204" pitchFamily="49" charset="0"/>
+              </a:rPr>
+              <a:t># ['skeleton', '13', '12', '20’]</a:t>
+            </a:r>
+          </a:p>
+          <a:p>
+            <a:pPr marL="0" indent="0">
+              <a:buNone/>
+            </a:pPr>
+            <a:endParaRPr lang="en-US" dirty="0">
+              <a:latin typeface="Consolas" panose="020B0609020204030204" pitchFamily="49" charset="0"/>
+              <a:cs typeface="Consolas" panose="020B0609020204030204" pitchFamily="49" charset="0"/>
+            </a:endParaRPr>
+          </a:p>
+          <a:p>
+            <a:r>
+              <a:rPr lang="en-US" dirty="0"/>
+              <a:t>join – builds a single string from a list of items</a:t>
+            </a:r>
+          </a:p>
+          <a:p>
+            <a:pPr marL="0" indent="0">
+              <a:buNone/>
+            </a:pPr>
+            <a:r>
+              <a:rPr lang="en-US" dirty="0">
+                <a:latin typeface="Consolas" panose="020B0609020204030204" pitchFamily="49" charset="0"/>
+                <a:cs typeface="Consolas" panose="020B0609020204030204" pitchFamily="49" charset="0"/>
+              </a:rPr>
+              <a:t>line =  </a:t>
+            </a:r>
+            <a:r>
+              <a:rPr lang="en-US" dirty="0">
+                <a:solidFill>
+                  <a:srgbClr val="6A8759"/>
+                </a:solidFill>
+                <a:latin typeface="Consolas" panose="020B0609020204030204" pitchFamily="49" charset="0"/>
+                <a:cs typeface="Consolas" panose="020B0609020204030204" pitchFamily="49" charset="0"/>
+              </a:rPr>
+              <a:t>";"</a:t>
+            </a:r>
+            <a:r>
+              <a:rPr lang="en-US" dirty="0">
+                <a:latin typeface="Consolas" panose="020B0609020204030204" pitchFamily="49" charset="0"/>
+                <a:cs typeface="Consolas" panose="020B0609020204030204" pitchFamily="49" charset="0"/>
+              </a:rPr>
+              <a:t>.join(csv) </a:t>
+            </a:r>
+            <a:r>
+              <a:rPr lang="en-US" dirty="0">
+                <a:solidFill>
+                  <a:srgbClr val="808080"/>
+                </a:solidFill>
+                <a:latin typeface="Consolas" panose="020B0609020204030204" pitchFamily="49" charset="0"/>
+                <a:cs typeface="Consolas" panose="020B0609020204030204" pitchFamily="49" charset="0"/>
+              </a:rPr>
+              <a:t># skeleton;13;12;20</a:t>
+            </a:r>
+            <a:endParaRPr lang="en-US" dirty="0">
+              <a:latin typeface="Consolas" panose="020B0609020204030204" pitchFamily="49" charset="0"/>
+              <a:cs typeface="Consolas" panose="020B0609020204030204" pitchFamily="49" charset="0"/>
+            </a:endParaRPr>
+          </a:p>
+        </p:txBody>
+      </p:sp>
+    </p:spTree>
+    <p:extLst>
+      <p:ext uri="{BB962C8B-B14F-4D97-AF65-F5344CB8AC3E}">
+        <p14:creationId xmlns:p14="http://schemas.microsoft.com/office/powerpoint/2010/main" val="1824667661"/>
+      </p:ext>
+    </p:extLst>
+  </p:cSld>
+  <p:clrMapOvr>
+    <a:masterClrMapping/>
+  </p:clrMapOvr>
+  <mc:AlternateContent xmlns:mc="http://schemas.openxmlformats.org/markup-compatibility/2006" xmlns:p14="http://schemas.microsoft.com/office/powerpoint/2010/main">
+    <mc:Choice Requires="p14">
+      <p:transition p14:dur="300">
+        <p:fade/>
+      </p:transition>
+    </mc:Choice>
+    <mc:Fallback xmlns="">
+      <p:transition>
+        <p:fade/>
+      </p:transition>
+    </mc:Fallback>
+  </mc:AlternateContent>
+</p:sld>
+</file>
+
+<file path=ppt/slides/slide12.xml><?xml version="1.0" encoding="utf-8"?>
 <p:sld xmlns:a="http://schemas.openxmlformats.org/drawingml/2006/main" xmlns:r="http://schemas.openxmlformats.org/officeDocument/2006/relationships" xmlns:p="http://schemas.openxmlformats.org/presentationml/2006/main">
   <p:cSld>
     <p:spTree>
@@ -10227,7 +10865,7 @@
 </p:sld>
 </file>
 
-<file path=ppt/slides/slide11.xml><?xml version="1.0" encoding="utf-8"?>
+<file path=ppt/slides/slide13.xml><?xml version="1.0" encoding="utf-8"?>
 <p:sld xmlns:a="http://schemas.openxmlformats.org/drawingml/2006/main" xmlns:r="http://schemas.openxmlformats.org/officeDocument/2006/relationships" xmlns:p="http://schemas.openxmlformats.org/presentationml/2006/main">
   <p:cSld>
     <p:spTree>
@@ -10249,7 +10887,7 @@
           <p:cNvPr id="2" name="Title 1">
             <a:extLst>
               <a:ext uri="{FF2B5EF4-FFF2-40B4-BE49-F238E27FC236}">
-                <a16:creationId xmlns:a16="http://schemas.microsoft.com/office/drawing/2014/main" id="{560D7DB4-EFD8-4C4F-B554-9867192F8BB3}"/>
+                <a16:creationId xmlns:a16="http://schemas.microsoft.com/office/drawing/2014/main" id="{C07FE3CE-C8B2-45A5-9D98-A8F5FC60F8E4}"/>
               </a:ext>
             </a:extLst>
           </p:cNvPr>
@@ -10260,14 +10898,19 @@
             <p:ph type="title"/>
           </p:nvPr>
         </p:nvSpPr>
-        <p:spPr/>
+        <p:spPr>
+          <a:xfrm>
+            <a:off x="628075" y="448059"/>
+            <a:ext cx="5047011" cy="1015663"/>
+          </a:xfrm>
+        </p:spPr>
         <p:txBody>
           <a:bodyPr/>
           <a:lstStyle/>
           <a:p>
             <a:r>
               <a:rPr lang="en-US" dirty="0"/>
-              <a:t>Split and Join</a:t>
+              <a:t>Practice</a:t>
             </a:r>
           </a:p>
         </p:txBody>
@@ -10277,7 +10920,7 @@
           <p:cNvPr id="3" name="Text Placeholder 2">
             <a:extLst>
               <a:ext uri="{FF2B5EF4-FFF2-40B4-BE49-F238E27FC236}">
-                <a16:creationId xmlns:a16="http://schemas.microsoft.com/office/drawing/2014/main" id="{1AF94B93-29DC-2E47-904F-29D20F25F1BB}"/>
+                <a16:creationId xmlns:a16="http://schemas.microsoft.com/office/drawing/2014/main" id="{F20529FE-93FA-4562-B6C3-0CCDEA22B45F}"/>
               </a:ext>
             </a:extLst>
           </p:cNvPr>
@@ -10290,8 +10933,8 @@
         </p:nvSpPr>
         <p:spPr>
           <a:xfrm>
-            <a:off x="628075" y="1776683"/>
-            <a:ext cx="9290625" cy="2810898"/>
+            <a:off x="628076" y="1950530"/>
+            <a:ext cx="12449296" cy="4774897"/>
           </a:xfrm>
         </p:spPr>
         <p:txBody>
@@ -10300,136 +10943,388 @@
           <a:p>
             <a:r>
               <a:rPr lang="en-US" dirty="0"/>
-              <a:t>split – converts a string into list of strings</a:t>
+              <a:t>Given the following String</a:t>
+            </a:r>
+          </a:p>
+          <a:p>
+            <a:r>
+              <a:rPr lang="en-US" dirty="0">
+                <a:latin typeface="Consolas" panose="020B0609020204030204" pitchFamily="49" charset="0"/>
+              </a:rPr>
+              <a:t>“</a:t>
+            </a:r>
+            <a:r>
+              <a:rPr lang="en-US" dirty="0" err="1">
+                <a:latin typeface="Consolas" panose="020B0609020204030204" pitchFamily="49" charset="0"/>
+              </a:rPr>
+              <a:t>Amy</a:t>
+            </a:r>
+            <a:r>
+              <a:rPr lang="en-US" b="1" dirty="0" err="1">
+                <a:latin typeface="Consolas" panose="020B0609020204030204" pitchFamily="49" charset="0"/>
+              </a:rPr>
+              <a:t>:</a:t>
+            </a:r>
+            <a:r>
+              <a:rPr lang="en-US" dirty="0" err="1">
+                <a:latin typeface="Consolas" panose="020B0609020204030204" pitchFamily="49" charset="0"/>
+              </a:rPr>
+              <a:t>Classes</a:t>
+            </a:r>
+            <a:r>
+              <a:rPr lang="en-US" dirty="0">
+                <a:latin typeface="Consolas" panose="020B0609020204030204" pitchFamily="49" charset="0"/>
+              </a:rPr>
+              <a:t>=CHEM107(B),GEO120(C),CS164(A)</a:t>
+            </a:r>
+            <a:r>
+              <a:rPr lang="en-US" b="1" dirty="0">
+                <a:latin typeface="Consolas" panose="020B0609020204030204" pitchFamily="49" charset="0"/>
+              </a:rPr>
+              <a:t>;</a:t>
+            </a:r>
+            <a:r>
+              <a:rPr lang="en-US" dirty="0" err="1">
+                <a:latin typeface="Consolas" panose="020B0609020204030204" pitchFamily="49" charset="0"/>
+              </a:rPr>
+              <a:t>Rory:classes</a:t>
+            </a:r>
+            <a:r>
+              <a:rPr lang="en-US" dirty="0">
+                <a:latin typeface="Consolas" panose="020B0609020204030204" pitchFamily="49" charset="0"/>
+              </a:rPr>
+              <a:t>=CS150B(B),CHEM107</a:t>
+            </a:r>
+            <a:r>
+              <a:rPr lang="en-US">
+                <a:latin typeface="Consolas" panose="020B0609020204030204" pitchFamily="49" charset="0"/>
+              </a:rPr>
+              <a:t>(A-),</a:t>
+            </a:r>
+            <a:r>
+              <a:rPr lang="en-US" dirty="0">
+                <a:latin typeface="Consolas" panose="020B0609020204030204" pitchFamily="49" charset="0"/>
+              </a:rPr>
+              <a:t>MATH151(B)”</a:t>
+            </a:r>
+          </a:p>
+          <a:p>
+            <a:r>
+              <a:rPr lang="en-US" dirty="0"/>
+              <a:t>Write code that helps you find grade:</a:t>
             </a:r>
           </a:p>
           <a:p>
             <a:pPr lvl="1"/>
             <a:r>
               <a:rPr lang="en-US" dirty="0"/>
-              <a:t>split on the string passed into it!</a:t>
-            </a:r>
-          </a:p>
-          <a:p>
-            <a:pPr marL="0" indent="0">
+              <a:t>Based On student and course</a:t>
+            </a:r>
+          </a:p>
+          <a:p>
+            <a:pPr lvl="1"/>
+            <a:r>
+              <a:rPr lang="en-US" dirty="0"/>
+              <a:t>Case is *optional* (hint: recall .lower())</a:t>
+            </a:r>
+          </a:p>
+          <a:p>
+            <a:r>
+              <a:rPr lang="en-US" dirty="0"/>
+              <a:t>Step 1 – write it out!</a:t>
+            </a:r>
+          </a:p>
+          <a:p>
+            <a:r>
+              <a:rPr lang="en-US" dirty="0"/>
+              <a:t>Step 2 – Notice the pattern! </a:t>
+            </a:r>
+          </a:p>
+          <a:p>
+            <a:pPr lvl="1"/>
+            <a:r>
+              <a:rPr lang="en-US" dirty="0"/>
+              <a:t>Can you find just the student? – ok, code that now</a:t>
+            </a:r>
+          </a:p>
+          <a:p>
+            <a:pPr lvl="1"/>
+            <a:r>
+              <a:rPr lang="en-US" dirty="0"/>
+              <a:t>Can you find the class after you find the student, but before the next student? Ok, code that out!</a:t>
+            </a:r>
+          </a:p>
+          <a:p>
+            <a:pPr lvl="1"/>
+            <a:endParaRPr lang="en-US" dirty="0"/>
+          </a:p>
+          <a:p>
+            <a:endParaRPr lang="en-US" dirty="0"/>
+          </a:p>
+        </p:txBody>
+      </p:sp>
+      <p:sp>
+        <p:nvSpPr>
+          <p:cNvPr id="4" name="Rectangle 1">
+            <a:extLst>
+              <a:ext uri="{FF2B5EF4-FFF2-40B4-BE49-F238E27FC236}">
+                <a16:creationId xmlns:a16="http://schemas.microsoft.com/office/drawing/2014/main" id="{CEFA7217-8FA8-4105-97CB-DA938F7E0C57}"/>
+              </a:ext>
+            </a:extLst>
+          </p:cNvPr>
+          <p:cNvSpPr>
+            <a:spLocks noChangeArrowheads="1"/>
+          </p:cNvSpPr>
+          <p:nvPr/>
+        </p:nvSpPr>
+        <p:spPr bwMode="auto">
+          <a:xfrm>
+            <a:off x="628075" y="5995717"/>
+            <a:ext cx="7149393" cy="1077218"/>
+          </a:xfrm>
+          <a:prstGeom prst="rect">
+            <a:avLst/>
+          </a:prstGeom>
+          <a:solidFill>
+            <a:srgbClr val="FFFFFF"/>
+          </a:solidFill>
+          <a:ln>
+            <a:noFill/>
+          </a:ln>
+          <a:effectLst/>
+          <a:extLst>
+            <a:ext uri="{91240B29-F687-4F45-9708-019B960494DF}">
+              <a14:hiddenLine xmlns:a14="http://schemas.microsoft.com/office/drawing/2010/main" w="9525">
+                <a:solidFill>
+                  <a:schemeClr val="tx1"/>
+                </a:solidFill>
+                <a:miter lim="800000"/>
+                <a:headEnd/>
+                <a:tailEnd/>
+              </a14:hiddenLine>
+            </a:ext>
+            <a:ext uri="{AF507438-7753-43E0-B8FC-AC1667EBCBE1}">
+              <a14:hiddenEffects xmlns:a14="http://schemas.microsoft.com/office/drawing/2010/main">
+                <a:effectLst>
+                  <a:outerShdw dist="35921" dir="2700000" algn="ctr" rotWithShape="0">
+                    <a:schemeClr val="bg2"/>
+                  </a:outerShdw>
+                </a:effectLst>
+              </a14:hiddenEffects>
+            </a:ext>
+          </a:extLst>
+        </p:spPr>
+        <p:txBody>
+          <a:bodyPr vert="horz" wrap="none" lIns="91440" tIns="45720" rIns="91440" bIns="45720" numCol="1" anchor="ctr" anchorCtr="0" compatLnSpc="1">
+            <a:prstTxWarp prst="textNoShape">
+              <a:avLst/>
+            </a:prstTxWarp>
+            <a:spAutoFit/>
+          </a:bodyPr>
+          <a:lstStyle/>
+          <a:p>
+            <a:pPr marL="0" marR="0" lvl="0" indent="0" algn="l" defTabSz="914400" rtl="0" eaLnBrk="0" fontAlgn="base" latinLnBrk="0" hangingPunct="0">
+              <a:lnSpc>
+                <a:spcPct val="100000"/>
+              </a:lnSpc>
+              <a:spcBef>
+                <a:spcPct val="0"/>
+              </a:spcBef>
+              <a:spcAft>
+                <a:spcPct val="0"/>
+              </a:spcAft>
+              <a:buClrTx/>
+              <a:buSzTx/>
+              <a:buFontTx/>
               <a:buNone/>
+              <a:tabLst/>
             </a:pPr>
             <a:r>
-              <a:rPr lang="en-US" dirty="0">
-                <a:latin typeface="Consolas" panose="020B0609020204030204" pitchFamily="49" charset="0"/>
-                <a:cs typeface="Consolas" panose="020B0609020204030204" pitchFamily="49" charset="0"/>
-              </a:rPr>
-              <a:t>csv = </a:t>
-            </a:r>
-            <a:r>
-              <a:rPr lang="en-US" dirty="0">
-                <a:solidFill>
-                  <a:srgbClr val="6A8759"/>
-                </a:solidFill>
-                <a:latin typeface="Consolas" panose="020B0609020204030204" pitchFamily="49" charset="0"/>
-                <a:cs typeface="Consolas" panose="020B0609020204030204" pitchFamily="49" charset="0"/>
-              </a:rPr>
-              <a:t>"skeleton,13,12,20"</a:t>
-            </a:r>
-            <a:r>
-              <a:rPr lang="en-US" dirty="0">
-                <a:latin typeface="Consolas" panose="020B0609020204030204" pitchFamily="49" charset="0"/>
-                <a:cs typeface="Consolas" panose="020B0609020204030204" pitchFamily="49" charset="0"/>
-              </a:rPr>
-              <a:t>.split(</a:t>
-            </a:r>
-            <a:r>
-              <a:rPr lang="en-US" dirty="0">
-                <a:solidFill>
-                  <a:srgbClr val="6A8759"/>
-                </a:solidFill>
-                <a:latin typeface="Consolas" panose="020B0609020204030204" pitchFamily="49" charset="0"/>
-                <a:cs typeface="Consolas" panose="020B0609020204030204" pitchFamily="49" charset="0"/>
-              </a:rPr>
-              <a:t>","</a:t>
-            </a:r>
-            <a:r>
-              <a:rPr lang="en-US" dirty="0">
-                <a:latin typeface="Consolas" panose="020B0609020204030204" pitchFamily="49" charset="0"/>
-                <a:cs typeface="Consolas" panose="020B0609020204030204" pitchFamily="49" charset="0"/>
-              </a:rPr>
-              <a:t>) </a:t>
-            </a:r>
-            <a:r>
-              <a:rPr lang="en-US" dirty="0">
+              <a:rPr kumimoji="0" lang="en-US" altLang="en-US" sz="3200" b="1" i="0" u="none" strike="noStrike" cap="none" normalizeH="0" baseline="0" dirty="0">
+                <a:ln>
+                  <a:noFill/>
+                </a:ln>
+                <a:solidFill>
+                  <a:srgbClr val="000080"/>
+                </a:solidFill>
+                <a:effectLst/>
+                <a:latin typeface="JetBrains Mono"/>
+              </a:rPr>
+              <a:t>def </a:t>
+            </a:r>
+            <a:r>
+              <a:rPr kumimoji="0" lang="en-US" altLang="en-US" sz="3200" b="0" i="0" u="none" strike="noStrike" cap="none" normalizeH="0" baseline="0" dirty="0" err="1">
+                <a:ln>
+                  <a:noFill/>
+                </a:ln>
+                <a:solidFill>
+                  <a:srgbClr val="000000"/>
+                </a:solidFill>
+                <a:effectLst/>
+                <a:latin typeface="JetBrains Mono"/>
+              </a:rPr>
+              <a:t>find_grade</a:t>
+            </a:r>
+            <a:r>
+              <a:rPr kumimoji="0" lang="en-US" altLang="en-US" sz="3200" b="0" i="0" u="none" strike="noStrike" cap="none" normalizeH="0" baseline="0" dirty="0">
+                <a:ln>
+                  <a:noFill/>
+                </a:ln>
+                <a:solidFill>
+                  <a:srgbClr val="000000"/>
+                </a:solidFill>
+                <a:effectLst/>
+                <a:latin typeface="JetBrains Mono"/>
+              </a:rPr>
+              <a:t>(student, course, </a:t>
+            </a:r>
+            <a:r>
+              <a:rPr kumimoji="0" lang="en-US" altLang="en-US" sz="3200" b="0" i="0" u="none" strike="noStrike" cap="none" normalizeH="0" baseline="0" dirty="0" err="1">
+                <a:ln>
+                  <a:noFill/>
+                </a:ln>
+                <a:solidFill>
+                  <a:srgbClr val="000000"/>
+                </a:solidFill>
+                <a:effectLst/>
+                <a:latin typeface="JetBrains Mono"/>
+              </a:rPr>
+              <a:t>data_str</a:t>
+            </a:r>
+            <a:r>
+              <a:rPr kumimoji="0" lang="en-US" altLang="en-US" sz="3200" b="0" i="0" u="none" strike="noStrike" cap="none" normalizeH="0" baseline="0" dirty="0">
+                <a:ln>
+                  <a:noFill/>
+                </a:ln>
+                <a:solidFill>
+                  <a:srgbClr val="000000"/>
+                </a:solidFill>
+                <a:effectLst/>
+                <a:latin typeface="JetBrains Mono"/>
+              </a:rPr>
+              <a:t>):</a:t>
+            </a:r>
+            <a:br>
+              <a:rPr kumimoji="0" lang="en-US" altLang="en-US" sz="3200" b="0" i="0" u="none" strike="noStrike" cap="none" normalizeH="0" baseline="0" dirty="0">
+                <a:ln>
+                  <a:noFill/>
+                </a:ln>
+                <a:solidFill>
+                  <a:srgbClr val="000000"/>
+                </a:solidFill>
+                <a:effectLst/>
+                <a:latin typeface="JetBrains Mono"/>
+              </a:rPr>
+            </a:br>
+            <a:r>
+              <a:rPr kumimoji="0" lang="en-US" altLang="en-US" sz="3200" b="0" i="0" u="none" strike="noStrike" cap="none" normalizeH="0" baseline="0" dirty="0">
+                <a:ln>
+                  <a:noFill/>
+                </a:ln>
+                <a:solidFill>
+                  <a:srgbClr val="000000"/>
+                </a:solidFill>
+                <a:effectLst/>
+                <a:latin typeface="JetBrains Mono"/>
+              </a:rPr>
+              <a:t>    </a:t>
+            </a:r>
+            <a:r>
+              <a:rPr kumimoji="0" lang="en-US" altLang="en-US" sz="3200" b="0" i="1" u="none" strike="noStrike" cap="none" normalizeH="0" baseline="0" dirty="0">
+                <a:ln>
+                  <a:noFill/>
+                </a:ln>
                 <a:solidFill>
                   <a:srgbClr val="808080"/>
                 </a:solidFill>
-                <a:latin typeface="Consolas" panose="020B0609020204030204" pitchFamily="49" charset="0"/>
-                <a:cs typeface="Consolas" panose="020B0609020204030204" pitchFamily="49" charset="0"/>
-              </a:rPr>
-              <a:t># ['skeleton', '13', '12', '20’]</a:t>
-            </a:r>
-          </a:p>
-          <a:p>
-            <a:pPr marL="0" indent="0">
-              <a:buNone/>
-            </a:pPr>
-            <a:endParaRPr lang="en-US" dirty="0">
-              <a:latin typeface="Consolas" panose="020B0609020204030204" pitchFamily="49" charset="0"/>
-              <a:cs typeface="Consolas" panose="020B0609020204030204" pitchFamily="49" charset="0"/>
+                <a:effectLst/>
+                <a:latin typeface="JetBrains Mono"/>
+              </a:rPr>
+              <a:t>#</a:t>
+            </a:r>
+            <a:r>
+              <a:rPr kumimoji="0" lang="en-US" altLang="en-US" sz="3200" b="1" i="1" u="none" strike="noStrike" cap="none" normalizeH="0" baseline="0" dirty="0">
+                <a:ln>
+                  <a:noFill/>
+                </a:ln>
+                <a:solidFill>
+                  <a:srgbClr val="0073BF"/>
+                </a:solidFill>
+                <a:effectLst/>
+                <a:latin typeface="JetBrains Mono"/>
+              </a:rPr>
+              <a:t>TODO Your Code Here</a:t>
+            </a:r>
+            <a:endParaRPr kumimoji="0" lang="en-US" altLang="en-US" sz="3200" b="0" i="0" u="none" strike="noStrike" cap="none" normalizeH="0" baseline="0" dirty="0">
+              <a:ln>
+                <a:noFill/>
+              </a:ln>
+              <a:solidFill>
+                <a:schemeClr val="tx1"/>
+              </a:solidFill>
+              <a:effectLst/>
+              <a:latin typeface="Arial" panose="020B0604020202020204" pitchFamily="34" charset="0"/>
             </a:endParaRPr>
           </a:p>
+        </p:txBody>
+      </p:sp>
+      <p:sp>
+        <p:nvSpPr>
+          <p:cNvPr id="5" name="TextBox 4">
+            <a:extLst>
+              <a:ext uri="{FF2B5EF4-FFF2-40B4-BE49-F238E27FC236}">
+                <a16:creationId xmlns:a16="http://schemas.microsoft.com/office/drawing/2014/main" id="{D37E005E-D9E9-46F7-BC26-633D664C1AB3}"/>
+              </a:ext>
+            </a:extLst>
+          </p:cNvPr>
+          <p:cNvSpPr txBox="1"/>
+          <p:nvPr/>
+        </p:nvSpPr>
+        <p:spPr>
+          <a:xfrm>
+            <a:off x="9477829" y="319314"/>
+            <a:ext cx="3817257" cy="1323439"/>
+          </a:xfrm>
+          <a:prstGeom prst="rect">
+            <a:avLst/>
+          </a:prstGeom>
+          <a:noFill/>
+        </p:spPr>
+        <p:txBody>
+          <a:bodyPr wrap="square" rtlCol="0">
+            <a:spAutoFit/>
+          </a:bodyPr>
+          <a:lstStyle/>
           <a:p>
             <a:r>
               <a:rPr lang="en-US" dirty="0"/>
-              <a:t>join – builds a single string from a list of items</a:t>
-            </a:r>
-          </a:p>
-          <a:p>
-            <a:pPr marL="0" indent="0">
-              <a:buNone/>
-            </a:pPr>
-            <a:r>
-              <a:rPr lang="en-US" dirty="0">
-                <a:latin typeface="Consolas" panose="020B0609020204030204" pitchFamily="49" charset="0"/>
-                <a:cs typeface="Consolas" panose="020B0609020204030204" pitchFamily="49" charset="0"/>
-              </a:rPr>
-              <a:t>line =  </a:t>
-            </a:r>
-            <a:r>
-              <a:rPr lang="en-US" dirty="0">
-                <a:solidFill>
-                  <a:srgbClr val="6A8759"/>
-                </a:solidFill>
-                <a:latin typeface="Consolas" panose="020B0609020204030204" pitchFamily="49" charset="0"/>
-                <a:cs typeface="Consolas" panose="020B0609020204030204" pitchFamily="49" charset="0"/>
-              </a:rPr>
-              <a:t>";"</a:t>
-            </a:r>
-            <a:r>
-              <a:rPr lang="en-US" dirty="0">
-                <a:latin typeface="Consolas" panose="020B0609020204030204" pitchFamily="49" charset="0"/>
-                <a:cs typeface="Consolas" panose="020B0609020204030204" pitchFamily="49" charset="0"/>
-              </a:rPr>
-              <a:t>.join(csv) </a:t>
-            </a:r>
-            <a:r>
-              <a:rPr lang="en-US" dirty="0">
-                <a:solidFill>
-                  <a:srgbClr val="808080"/>
-                </a:solidFill>
-                <a:latin typeface="Consolas" panose="020B0609020204030204" pitchFamily="49" charset="0"/>
-                <a:cs typeface="Consolas" panose="020B0609020204030204" pitchFamily="49" charset="0"/>
-              </a:rPr>
-              <a:t># skeleton;13;12;20</a:t>
-            </a:r>
-            <a:endParaRPr lang="en-US" dirty="0">
-              <a:latin typeface="Consolas" panose="020B0609020204030204" pitchFamily="49" charset="0"/>
-              <a:cs typeface="Consolas" panose="020B0609020204030204" pitchFamily="49" charset="0"/>
-            </a:endParaRPr>
+              <a:t>Useful Functions</a:t>
+            </a:r>
+          </a:p>
+          <a:p>
+            <a:r>
+              <a:rPr lang="en-US" dirty="0"/>
+              <a:t>in operator</a:t>
+            </a:r>
+          </a:p>
+          <a:p>
+            <a:r>
+              <a:rPr lang="en-US" dirty="0"/>
+              <a:t>find function</a:t>
+            </a:r>
+          </a:p>
+          <a:p>
+            <a:r>
+              <a:rPr lang="en-US" dirty="0"/>
+              <a:t>slice operator [:]</a:t>
+            </a:r>
           </a:p>
         </p:txBody>
       </p:sp>
     </p:spTree>
     <p:extLst>
       <p:ext uri="{BB962C8B-B14F-4D97-AF65-F5344CB8AC3E}">
-        <p14:creationId xmlns:p14="http://schemas.microsoft.com/office/powerpoint/2010/main" val="1824667661"/>
+        <p14:creationId xmlns:p14="http://schemas.microsoft.com/office/powerpoint/2010/main" val="271868859"/>
       </p:ext>
     </p:extLst>
   </p:cSld>
@@ -10451,8 +11346,8 @@
 </p:sld>
 </file>
 
-<file path=ppt/slides/slide12.xml><?xml version="1.0" encoding="utf-8"?>
-<p:sld xmlns:a="http://schemas.openxmlformats.org/drawingml/2006/main" xmlns:r="http://schemas.openxmlformats.org/officeDocument/2006/relationships" xmlns:p="http://schemas.openxmlformats.org/presentationml/2006/main">
+<file path=ppt/slides/slide14.xml><?xml version="1.0" encoding="utf-8"?>
+<p:sld xmlns:a="http://schemas.openxmlformats.org/drawingml/2006/main" xmlns:r="http://schemas.openxmlformats.org/officeDocument/2006/relationships" xmlns:p="http://schemas.openxmlformats.org/presentationml/2006/main" show="0">
   <p:cSld>
     <p:spTree>
       <p:nvGrpSpPr>
@@ -12167,13 +13062,13 @@
   <p:clrMapOvr>
     <a:masterClrMapping/>
   </p:clrMapOvr>
-  <mc:AlternateContent xmlns:mc="http://schemas.openxmlformats.org/markup-compatibility/2006" xmlns:p14="http://schemas.microsoft.com/office/powerpoint/2010/main">
-    <mc:Choice Requires="p14">
+  <mc:AlternateContent xmlns:mc="http://schemas.openxmlformats.org/markup-compatibility/2006">
+    <mc:Choice xmlns:p14="http://schemas.microsoft.com/office/powerpoint/2010/main" Requires="p14">
       <p:transition p14:dur="300">
         <p:fade/>
       </p:transition>
     </mc:Choice>
-    <mc:Fallback xmlns="">
+    <mc:Fallback>
       <p:transition>
         <p:fade/>
       </p:transition>
@@ -12183,6 +13078,300 @@
 </file>
 
 <file path=ppt/slides/slide2.xml><?xml version="1.0" encoding="utf-8"?>
+<p:sld xmlns:a="http://schemas.openxmlformats.org/drawingml/2006/main" xmlns:r="http://schemas.openxmlformats.org/officeDocument/2006/relationships" xmlns:p="http://schemas.openxmlformats.org/presentationml/2006/main">
+  <p:cSld>
+    <p:spTree>
+      <p:nvGrpSpPr>
+        <p:cNvPr id="1" name=""/>
+        <p:cNvGrpSpPr/>
+        <p:nvPr/>
+      </p:nvGrpSpPr>
+      <p:grpSpPr>
+        <a:xfrm>
+          <a:off x="0" y="0"/>
+          <a:ext cx="0" cy="0"/>
+          <a:chOff x="0" y="0"/>
+          <a:chExt cx="0" cy="0"/>
+        </a:xfrm>
+      </p:grpSpPr>
+      <p:sp>
+        <p:nvSpPr>
+          <p:cNvPr id="4" name="Title 3">
+            <a:extLst>
+              <a:ext uri="{FF2B5EF4-FFF2-40B4-BE49-F238E27FC236}">
+                <a16:creationId xmlns:a16="http://schemas.microsoft.com/office/drawing/2014/main" id="{119AD8F2-D5DB-A84B-A5B3-F7935E3E6D1D}"/>
+              </a:ext>
+            </a:extLst>
+          </p:cNvPr>
+          <p:cNvSpPr>
+            <a:spLocks noGrp="1"/>
+          </p:cNvSpPr>
+          <p:nvPr>
+            <p:ph type="title"/>
+          </p:nvPr>
+        </p:nvSpPr>
+        <p:spPr>
+          <a:xfrm>
+            <a:off x="628076" y="607804"/>
+            <a:ext cx="5642096" cy="916848"/>
+          </a:xfrm>
+        </p:spPr>
+        <p:txBody>
+          <a:bodyPr/>
+          <a:lstStyle/>
+          <a:p>
+            <a:r>
+              <a:rPr lang="en-US" dirty="0"/>
+              <a:t>Announcements</a:t>
+            </a:r>
+          </a:p>
+        </p:txBody>
+      </p:sp>
+      <p:sp>
+        <p:nvSpPr>
+          <p:cNvPr id="5" name="Text Placeholder 4">
+            <a:extLst>
+              <a:ext uri="{FF2B5EF4-FFF2-40B4-BE49-F238E27FC236}">
+                <a16:creationId xmlns:a16="http://schemas.microsoft.com/office/drawing/2014/main" id="{1BBD0DB5-379A-304F-9307-E7B1A89B08F7}"/>
+              </a:ext>
+            </a:extLst>
+          </p:cNvPr>
+          <p:cNvSpPr>
+            <a:spLocks noGrp="1"/>
+          </p:cNvSpPr>
+          <p:nvPr>
+            <p:ph type="body" idx="1"/>
+          </p:nvPr>
+        </p:nvSpPr>
+        <p:spPr>
+          <a:xfrm>
+            <a:off x="628075" y="1647163"/>
+            <a:ext cx="8395419" cy="4379259"/>
+          </a:xfrm>
+        </p:spPr>
+        <p:txBody>
+          <a:bodyPr/>
+          <a:lstStyle/>
+          <a:p>
+            <a:pPr marL="930762" lvl="1" indent="0">
+              <a:buNone/>
+            </a:pPr>
+            <a:endParaRPr lang="en-US" dirty="0"/>
+          </a:p>
+          <a:p>
+            <a:r>
+              <a:rPr lang="en-US" dirty="0"/>
+              <a:t>Reminder – readings are due </a:t>
+            </a:r>
+            <a:r>
+              <a:rPr lang="en-US" b="1" dirty="0"/>
+              <a:t>before</a:t>
+            </a:r>
+            <a:r>
+              <a:rPr lang="en-US" dirty="0"/>
+              <a:t> lecture</a:t>
+            </a:r>
+          </a:p>
+          <a:p>
+            <a:pPr lvl="1"/>
+            <a:r>
+              <a:rPr lang="en-US" dirty="0"/>
+              <a:t>You don’t have to do all of it - challenge problems can be challenging…</a:t>
+            </a:r>
+          </a:p>
+          <a:p>
+            <a:pPr lvl="1"/>
+            <a:r>
+              <a:rPr lang="en-US" dirty="0"/>
+              <a:t>You can return to them. </a:t>
+            </a:r>
+          </a:p>
+          <a:p>
+            <a:pPr lvl="1"/>
+            <a:r>
+              <a:rPr lang="en-US" dirty="0"/>
+              <a:t>We start off each lecture with a quiz from your reading! </a:t>
+            </a:r>
+          </a:p>
+          <a:p>
+            <a:r>
+              <a:rPr lang="en-US" dirty="0"/>
+              <a:t>Make sure to review knowledge checks and spread out their use! </a:t>
+            </a:r>
+          </a:p>
+          <a:p>
+            <a:endParaRPr lang="en-US" dirty="0"/>
+          </a:p>
+          <a:p>
+            <a:r>
+              <a:rPr lang="en-US" b="1" dirty="0"/>
+              <a:t>Thursday Lecture </a:t>
+            </a:r>
+            <a:r>
+              <a:rPr lang="en-US" dirty="0"/>
+              <a:t>(optional – but encouraged) – “So you think you may want to major or minor in CS?” (hint: your first semester is the easiest semester to declare! After that, it gets harder) </a:t>
+            </a:r>
+          </a:p>
+        </p:txBody>
+      </p:sp>
+      <p:sp>
+        <p:nvSpPr>
+          <p:cNvPr id="6" name="TextBox 5">
+            <a:extLst>
+              <a:ext uri="{FF2B5EF4-FFF2-40B4-BE49-F238E27FC236}">
+                <a16:creationId xmlns:a16="http://schemas.microsoft.com/office/drawing/2014/main" id="{32A3B87A-BBC0-704B-AC99-3984206450D5}"/>
+              </a:ext>
+            </a:extLst>
+          </p:cNvPr>
+          <p:cNvSpPr txBox="1"/>
+          <p:nvPr/>
+        </p:nvSpPr>
+        <p:spPr>
+          <a:xfrm>
+            <a:off x="9744412" y="2150737"/>
+            <a:ext cx="3892958" cy="2417650"/>
+          </a:xfrm>
+          <a:prstGeom prst="rect">
+            <a:avLst/>
+          </a:prstGeom>
+          <a:noFill/>
+        </p:spPr>
+        <p:txBody>
+          <a:bodyPr wrap="square" rtlCol="0">
+            <a:spAutoFit/>
+          </a:bodyPr>
+          <a:lstStyle/>
+          <a:p>
+            <a:r>
+              <a:rPr lang="en-US" sz="3022" dirty="0" err="1"/>
+              <a:t>Todo</a:t>
+            </a:r>
+            <a:r>
+              <a:rPr lang="en-US" sz="3022" dirty="0"/>
+              <a:t>:</a:t>
+            </a:r>
+          </a:p>
+          <a:p>
+            <a:r>
+              <a:rPr lang="en-US" sz="3022" dirty="0"/>
+              <a:t>Inclusive Design Paper – This Week!!</a:t>
+            </a:r>
+          </a:p>
+          <a:p>
+            <a:endParaRPr lang="en-US" sz="3022" dirty="0"/>
+          </a:p>
+          <a:p>
+            <a:endParaRPr lang="en-US" sz="3022" dirty="0"/>
+          </a:p>
+        </p:txBody>
+      </p:sp>
+      <p:sp>
+        <p:nvSpPr>
+          <p:cNvPr id="3" name="TextBox 2">
+            <a:extLst>
+              <a:ext uri="{FF2B5EF4-FFF2-40B4-BE49-F238E27FC236}">
+                <a16:creationId xmlns:a16="http://schemas.microsoft.com/office/drawing/2014/main" id="{219403AF-FCA0-4FAD-B2CD-E3D24CF8DD27}"/>
+              </a:ext>
+            </a:extLst>
+          </p:cNvPr>
+          <p:cNvSpPr txBox="1"/>
+          <p:nvPr/>
+        </p:nvSpPr>
+        <p:spPr>
+          <a:xfrm>
+            <a:off x="628075" y="6148934"/>
+            <a:ext cx="10580915" cy="1015663"/>
+          </a:xfrm>
+          <a:prstGeom prst="rect">
+            <a:avLst/>
+          </a:prstGeom>
+          <a:noFill/>
+        </p:spPr>
+        <p:txBody>
+          <a:bodyPr wrap="square" rtlCol="0">
+            <a:spAutoFit/>
+          </a:bodyPr>
+          <a:lstStyle/>
+          <a:p>
+            <a:r>
+              <a:rPr lang="en-US" dirty="0"/>
+              <a:t>CS 164 – Next Course In Sequence, also consider CS 220 (math and stats especially) </a:t>
+            </a:r>
+          </a:p>
+          <a:p>
+            <a:r>
+              <a:rPr lang="en-US" dirty="0"/>
+              <a:t>CO Jobs Report 2021 – 77% of *all* new jobs in Colorado require programming</a:t>
+            </a:r>
+          </a:p>
+          <a:p>
+            <a:r>
+              <a:rPr lang="en-US" dirty="0"/>
+              <a:t>60% of all STEM jobs requires *advanced* (200-300 level) </a:t>
+            </a:r>
+          </a:p>
+        </p:txBody>
+      </p:sp>
+      <p:sp>
+        <p:nvSpPr>
+          <p:cNvPr id="7" name="TextBox 6">
+            <a:extLst>
+              <a:ext uri="{FF2B5EF4-FFF2-40B4-BE49-F238E27FC236}">
+                <a16:creationId xmlns:a16="http://schemas.microsoft.com/office/drawing/2014/main" id="{BF16D510-BC74-4FA5-AFD2-193B039115A5}"/>
+              </a:ext>
+            </a:extLst>
+          </p:cNvPr>
+          <p:cNvSpPr txBox="1"/>
+          <p:nvPr/>
+        </p:nvSpPr>
+        <p:spPr>
+          <a:xfrm>
+            <a:off x="7228114" y="362857"/>
+            <a:ext cx="6125029" cy="707886"/>
+          </a:xfrm>
+          <a:prstGeom prst="rect">
+            <a:avLst/>
+          </a:prstGeom>
+          <a:solidFill>
+            <a:schemeClr val="accent2"/>
+          </a:solidFill>
+        </p:spPr>
+        <p:txBody>
+          <a:bodyPr wrap="square" rtlCol="0">
+            <a:spAutoFit/>
+          </a:bodyPr>
+          <a:lstStyle/>
+          <a:p>
+            <a:r>
+              <a:rPr lang="en-US" b="1" dirty="0"/>
+              <a:t>Opening Question: </a:t>
+            </a:r>
+          </a:p>
+          <a:p>
+            <a:r>
+              <a:rPr lang="en-US" dirty="0"/>
+              <a:t>How is your paper coming along?</a:t>
+            </a:r>
+          </a:p>
+        </p:txBody>
+      </p:sp>
+    </p:spTree>
+    <p:extLst>
+      <p:ext uri="{BB962C8B-B14F-4D97-AF65-F5344CB8AC3E}">
+        <p14:creationId xmlns:p14="http://schemas.microsoft.com/office/powerpoint/2010/main" val="926474781"/>
+      </p:ext>
+    </p:extLst>
+  </p:cSld>
+  <p:clrMapOvr>
+    <a:masterClrMapping/>
+  </p:clrMapOvr>
+  <p:transition>
+    <p:fade/>
+  </p:transition>
+</p:sld>
+</file>
+
+<file path=ppt/slides/slide3.xml><?xml version="1.0" encoding="utf-8"?>
 <p:sld xmlns:a="http://schemas.openxmlformats.org/drawingml/2006/main" xmlns:r="http://schemas.openxmlformats.org/officeDocument/2006/relationships" xmlns:p="http://schemas.openxmlformats.org/presentationml/2006/main">
   <p:cSld>
     <p:spTree>
@@ -12434,7 +13623,7 @@
 </p:sld>
 </file>
 
-<file path=ppt/slides/slide3.xml><?xml version="1.0" encoding="utf-8"?>
+<file path=ppt/slides/slide4.xml><?xml version="1.0" encoding="utf-8"?>
 <p:sld xmlns:a="http://schemas.openxmlformats.org/drawingml/2006/main" xmlns:r="http://schemas.openxmlformats.org/officeDocument/2006/relationships" xmlns:p="http://schemas.openxmlformats.org/presentationml/2006/main">
   <p:cSld>
     <p:spTree>
@@ -12715,7 +13904,7 @@
 </p:sld>
 </file>
 
-<file path=ppt/slides/slide4.xml><?xml version="1.0" encoding="utf-8"?>
+<file path=ppt/slides/slide5.xml><?xml version="1.0" encoding="utf-8"?>
 <p:sld xmlns:a="http://schemas.openxmlformats.org/drawingml/2006/main" xmlns:r="http://schemas.openxmlformats.org/officeDocument/2006/relationships" xmlns:p="http://schemas.openxmlformats.org/presentationml/2006/main">
   <p:cSld>
     <p:spTree>
@@ -13028,7 +14217,7 @@
 </p:sld>
 </file>
 
-<file path=ppt/slides/slide5.xml><?xml version="1.0" encoding="utf-8"?>
+<file path=ppt/slides/slide6.xml><?xml version="1.0" encoding="utf-8"?>
 <p:sld xmlns:a="http://schemas.openxmlformats.org/drawingml/2006/main" xmlns:r="http://schemas.openxmlformats.org/officeDocument/2006/relationships" xmlns:p="http://schemas.openxmlformats.org/presentationml/2006/main">
   <p:cSld>
     <p:spTree>
@@ -13371,7 +14560,7 @@
 </p:sld>
 </file>
 
-<file path=ppt/slides/slide6.xml><?xml version="1.0" encoding="utf-8"?>
+<file path=ppt/slides/slide7.xml><?xml version="1.0" encoding="utf-8"?>
 <p:sld xmlns:a="http://schemas.openxmlformats.org/drawingml/2006/main" xmlns:r="http://schemas.openxmlformats.org/officeDocument/2006/relationships" xmlns:p="http://schemas.openxmlformats.org/presentationml/2006/main">
   <p:cSld>
     <p:spTree>
@@ -13578,7 +14767,7 @@
 </p:sld>
 </file>
 
-<file path=ppt/slides/slide7.xml><?xml version="1.0" encoding="utf-8"?>
+<file path=ppt/slides/slide8.xml><?xml version="1.0" encoding="utf-8"?>
 <p:sld xmlns:a="http://schemas.openxmlformats.org/drawingml/2006/main" xmlns:r="http://schemas.openxmlformats.org/officeDocument/2006/relationships" xmlns:p="http://schemas.openxmlformats.org/presentationml/2006/main">
   <p:cSld>
     <p:spTree>
@@ -13713,7 +14902,7 @@
 </p:sld>
 </file>
 
-<file path=ppt/slides/slide8.xml><?xml version="1.0" encoding="utf-8"?>
+<file path=ppt/slides/slide9.xml><?xml version="1.0" encoding="utf-8"?>
 <p:sld xmlns:a="http://schemas.openxmlformats.org/drawingml/2006/main" xmlns:r="http://schemas.openxmlformats.org/officeDocument/2006/relationships" xmlns:p="http://schemas.openxmlformats.org/presentationml/2006/main">
   <p:cSld>
     <p:spTree>
@@ -13864,7 +15053,7 @@
         <p:spPr>
           <a:xfrm>
             <a:off x="7262858" y="1930260"/>
-            <a:ext cx="5926667" cy="2246769"/>
+            <a:ext cx="5926667" cy="3170099"/>
           </a:xfrm>
           <a:prstGeom prst="rect">
             <a:avLst/>
@@ -13889,14 +15078,24 @@
                 <a:solidFill>
                   <a:srgbClr val="6A8759"/>
                 </a:solidFill>
+                <a:latin typeface="Consolas" panose="020B0609020204030204" pitchFamily="49" charset="0"/>
+                <a:cs typeface="Consolas" panose="020B0609020204030204" pitchFamily="49" charset="0"/>
+              </a:rPr>
+              <a:t>“</a:t>
+            </a:r>
+            <a:r>
+              <a:rPr lang="en-US" dirty="0" err="1">
+                <a:solidFill>
+                  <a:srgbClr val="6A8759"/>
+                </a:solidFill>
                 <a:effectLst/>
                 <a:latin typeface="Consolas" panose="020B0609020204030204" pitchFamily="49" charset="0"/>
                 <a:cs typeface="Consolas" panose="020B0609020204030204" pitchFamily="49" charset="0"/>
               </a:rPr>
-              <a:t>"</a:t>
-            </a:r>
-            <a:r>
-              <a:rPr lang="en-US" dirty="0" err="1">
+              <a:t>conan</a:t>
+            </a:r>
+            <a:r>
+              <a:rPr lang="en-US" dirty="0">
                 <a:solidFill>
                   <a:srgbClr val="6A8759"/>
                 </a:solidFill>
@@ -13904,18 +15103,7 @@
                 <a:latin typeface="Consolas" panose="020B0609020204030204" pitchFamily="49" charset="0"/>
                 <a:cs typeface="Consolas" panose="020B0609020204030204" pitchFamily="49" charset="0"/>
               </a:rPr>
-              <a:t>conan</a:t>
-            </a:r>
-            <a:r>
-              <a:rPr lang="en-US" dirty="0">
-                <a:solidFill>
-                  <a:srgbClr val="6A8759"/>
-                </a:solidFill>
-                <a:effectLst/>
-                <a:latin typeface="Consolas" panose="020B0609020204030204" pitchFamily="49" charset="0"/>
-                <a:cs typeface="Consolas" panose="020B0609020204030204" pitchFamily="49" charset="0"/>
-              </a:rPr>
-              <a:t> the barbarian!"</a:t>
+              <a:t> the barbarian!”</a:t>
             </a:r>
             <a:br>
               <a:rPr lang="en-US" dirty="0">
@@ -13994,6 +15182,8 @@
               </a:rPr>
               <a:t>(first) </a:t>
             </a:r>
+          </a:p>
+          <a:p>
             <a:r>
               <a:rPr lang="en-US" dirty="0">
                 <a:solidFill>
@@ -14015,9 +15205,90 @@
                 <a:cs typeface="Consolas" panose="020B0609020204030204" pitchFamily="49" charset="0"/>
               </a:rPr>
               <a:t>conan</a:t>
+            </a:r>
+            <a:endParaRPr lang="en-US" dirty="0">
+              <a:solidFill>
+                <a:srgbClr val="808080"/>
+              </a:solidFill>
+              <a:latin typeface="Consolas" panose="020B0609020204030204" pitchFamily="49" charset="0"/>
+              <a:cs typeface="Consolas" panose="020B0609020204030204" pitchFamily="49" charset="0"/>
+            </a:endParaRPr>
+          </a:p>
+          <a:p>
+            <a:r>
+              <a:rPr lang="en-US" dirty="0" err="1">
+                <a:latin typeface="Consolas" panose="020B0609020204030204" pitchFamily="49" charset="0"/>
+                <a:cs typeface="Consolas" panose="020B0609020204030204" pitchFamily="49" charset="0"/>
+              </a:rPr>
+              <a:t>no_last</a:t>
+            </a:r>
+            <a:r>
+              <a:rPr lang="en-US" dirty="0">
+                <a:latin typeface="Consolas" panose="020B0609020204030204" pitchFamily="49" charset="0"/>
+                <a:cs typeface="Consolas" panose="020B0609020204030204" pitchFamily="49" charset="0"/>
+              </a:rPr>
+              <a:t> = barbarian[:-</a:t>
+            </a:r>
+            <a:r>
+              <a:rPr lang="en-US" dirty="0">
+                <a:solidFill>
+                  <a:srgbClr val="6897BB"/>
+                </a:solidFill>
+                <a:effectLst/>
+                <a:latin typeface="Consolas" panose="020B0609020204030204" pitchFamily="49" charset="0"/>
+                <a:cs typeface="Consolas" panose="020B0609020204030204" pitchFamily="49" charset="0"/>
+              </a:rPr>
+              <a:t>1</a:t>
+            </a:r>
+            <a:r>
+              <a:rPr lang="en-US" dirty="0">
+                <a:latin typeface="Consolas" panose="020B0609020204030204" pitchFamily="49" charset="0"/>
+                <a:cs typeface="Consolas" panose="020B0609020204030204" pitchFamily="49" charset="0"/>
+              </a:rPr>
+              <a:t>]</a:t>
             </a:r>
             <a:br>
               <a:rPr lang="en-US" dirty="0">
+                <a:latin typeface="Consolas" panose="020B0609020204030204" pitchFamily="49" charset="0"/>
+                <a:cs typeface="Consolas" panose="020B0609020204030204" pitchFamily="49" charset="0"/>
+              </a:rPr>
+            </a:br>
+            <a:r>
+              <a:rPr lang="en-US" dirty="0">
+                <a:solidFill>
+                  <a:srgbClr val="8888C6"/>
+                </a:solidFill>
+                <a:effectLst/>
+                <a:latin typeface="Consolas" panose="020B0609020204030204" pitchFamily="49" charset="0"/>
+                <a:cs typeface="Consolas" panose="020B0609020204030204" pitchFamily="49" charset="0"/>
+              </a:rPr>
+              <a:t>print</a:t>
+            </a:r>
+            <a:r>
+              <a:rPr lang="en-US" dirty="0">
+                <a:latin typeface="Consolas" panose="020B0609020204030204" pitchFamily="49" charset="0"/>
+                <a:cs typeface="Consolas" panose="020B0609020204030204" pitchFamily="49" charset="0"/>
+              </a:rPr>
+              <a:t>(</a:t>
+            </a:r>
+            <a:r>
+              <a:rPr lang="en-US" dirty="0" err="1">
+                <a:latin typeface="Consolas" panose="020B0609020204030204" pitchFamily="49" charset="0"/>
+                <a:cs typeface="Consolas" panose="020B0609020204030204" pitchFamily="49" charset="0"/>
+              </a:rPr>
+              <a:t>no_last</a:t>
+            </a:r>
+            <a:r>
+              <a:rPr lang="en-US" dirty="0">
+                <a:latin typeface="Consolas" panose="020B0609020204030204" pitchFamily="49" charset="0"/>
+                <a:cs typeface="Consolas" panose="020B0609020204030204" pitchFamily="49" charset="0"/>
+              </a:rPr>
+              <a:t>) </a:t>
+            </a:r>
+          </a:p>
+          <a:p>
+            <a:r>
+              <a:rPr lang="en-US" dirty="0">
                 <a:solidFill>
                   <a:srgbClr val="808080"/>
                 </a:solidFill>
@@ -14025,23 +15296,41 @@
                 <a:latin typeface="Consolas" panose="020B0609020204030204" pitchFamily="49" charset="0"/>
                 <a:cs typeface="Consolas" panose="020B0609020204030204" pitchFamily="49" charset="0"/>
               </a:rPr>
-            </a:br>
+              <a:t># </a:t>
+            </a:r>
             <a:r>
               <a:rPr lang="en-US" dirty="0" err="1">
-                <a:latin typeface="Consolas" panose="020B0609020204030204" pitchFamily="49" charset="0"/>
-                <a:cs typeface="Consolas" panose="020B0609020204030204" pitchFamily="49" charset="0"/>
-              </a:rPr>
-              <a:t>no_last</a:t>
+                <a:solidFill>
+                  <a:srgbClr val="808080"/>
+                </a:solidFill>
+                <a:effectLst/>
+                <a:latin typeface="Consolas" panose="020B0609020204030204" pitchFamily="49" charset="0"/>
+                <a:cs typeface="Consolas" panose="020B0609020204030204" pitchFamily="49" charset="0"/>
+              </a:rPr>
+              <a:t>conan</a:t>
             </a:r>
             <a:r>
               <a:rPr lang="en-US" dirty="0">
-                <a:latin typeface="Consolas" panose="020B0609020204030204" pitchFamily="49" charset="0"/>
-                <a:cs typeface="Consolas" panose="020B0609020204030204" pitchFamily="49" charset="0"/>
-              </a:rPr>
-              <a:t> = barbarian[:-</a:t>
-            </a:r>
+                <a:solidFill>
+                  <a:srgbClr val="808080"/>
+                </a:solidFill>
+                <a:effectLst/>
+                <a:latin typeface="Consolas" panose="020B0609020204030204" pitchFamily="49" charset="0"/>
+                <a:cs typeface="Consolas" panose="020B0609020204030204" pitchFamily="49" charset="0"/>
+              </a:rPr>
+              <a:t> the barbarian</a:t>
+            </a:r>
+          </a:p>
+          <a:p>
             <a:r>
               <a:rPr lang="en-US" dirty="0">
+                <a:latin typeface="Consolas" panose="020B0609020204030204" pitchFamily="49" charset="0"/>
+                <a:cs typeface="Consolas" panose="020B0609020204030204" pitchFamily="49" charset="0"/>
+              </a:rPr>
+              <a:t>barb = barbarian[-</a:t>
+            </a:r>
+            <a:r>
+              <a:rPr lang="en-US" dirty="0">
                 <a:solidFill>
                   <a:srgbClr val="6897BB"/>
                 </a:solidFill>
@@ -14049,14 +15338,14 @@
                 <a:latin typeface="Consolas" panose="020B0609020204030204" pitchFamily="49" charset="0"/>
                 <a:cs typeface="Consolas" panose="020B0609020204030204" pitchFamily="49" charset="0"/>
               </a:rPr>
-              <a:t>1</a:t>
+              <a:t>10</a:t>
             </a:r>
             <a:r>
               <a:rPr lang="en-US" dirty="0">
                 <a:latin typeface="Consolas" panose="020B0609020204030204" pitchFamily="49" charset="0"/>
                 <a:cs typeface="Consolas" panose="020B0609020204030204" pitchFamily="49" charset="0"/>
               </a:rPr>
-              <a:t>]</a:t>
+              <a:t>:]</a:t>
             </a:r>
             <a:br>
               <a:rPr lang="en-US" dirty="0">
@@ -14080,114 +15369,10 @@
                 <a:latin typeface="Consolas" panose="020B0609020204030204" pitchFamily="49" charset="0"/>
                 <a:cs typeface="Consolas" panose="020B0609020204030204" pitchFamily="49" charset="0"/>
               </a:rPr>
-              <a:t>(</a:t>
-            </a:r>
-            <a:r>
-              <a:rPr lang="en-US" dirty="0" err="1">
-                <a:latin typeface="Consolas" panose="020B0609020204030204" pitchFamily="49" charset="0"/>
-                <a:cs typeface="Consolas" panose="020B0609020204030204" pitchFamily="49" charset="0"/>
-              </a:rPr>
-              <a:t>no_last</a:t>
-            </a:r>
-            <a:r>
-              <a:rPr lang="en-US" dirty="0">
-                <a:latin typeface="Consolas" panose="020B0609020204030204" pitchFamily="49" charset="0"/>
-                <a:cs typeface="Consolas" panose="020B0609020204030204" pitchFamily="49" charset="0"/>
-              </a:rPr>
-              <a:t>) </a:t>
-            </a:r>
-            <a:r>
-              <a:rPr lang="en-US" dirty="0">
-                <a:solidFill>
-                  <a:srgbClr val="808080"/>
-                </a:solidFill>
-                <a:effectLst/>
-                <a:latin typeface="Consolas" panose="020B0609020204030204" pitchFamily="49" charset="0"/>
-                <a:cs typeface="Consolas" panose="020B0609020204030204" pitchFamily="49" charset="0"/>
-              </a:rPr>
-              <a:t># </a:t>
-            </a:r>
-            <a:r>
-              <a:rPr lang="en-US" dirty="0" err="1">
-                <a:solidFill>
-                  <a:srgbClr val="808080"/>
-                </a:solidFill>
-                <a:effectLst/>
-                <a:latin typeface="Consolas" panose="020B0609020204030204" pitchFamily="49" charset="0"/>
-                <a:cs typeface="Consolas" panose="020B0609020204030204" pitchFamily="49" charset="0"/>
-              </a:rPr>
-              <a:t>conan</a:t>
-            </a:r>
-            <a:r>
-              <a:rPr lang="en-US" dirty="0">
-                <a:solidFill>
-                  <a:srgbClr val="808080"/>
-                </a:solidFill>
-                <a:effectLst/>
-                <a:latin typeface="Consolas" panose="020B0609020204030204" pitchFamily="49" charset="0"/>
-                <a:cs typeface="Consolas" panose="020B0609020204030204" pitchFamily="49" charset="0"/>
-              </a:rPr>
-              <a:t> the barbarian</a:t>
-            </a:r>
-            <a:br>
-              <a:rPr lang="en-US" dirty="0">
-                <a:solidFill>
-                  <a:srgbClr val="808080"/>
-                </a:solidFill>
-                <a:effectLst/>
-                <a:latin typeface="Consolas" panose="020B0609020204030204" pitchFamily="49" charset="0"/>
-                <a:cs typeface="Consolas" panose="020B0609020204030204" pitchFamily="49" charset="0"/>
-              </a:rPr>
-            </a:br>
-            <a:r>
-              <a:rPr lang="en-US" dirty="0">
-                <a:latin typeface="Consolas" panose="020B0609020204030204" pitchFamily="49" charset="0"/>
-                <a:cs typeface="Consolas" panose="020B0609020204030204" pitchFamily="49" charset="0"/>
-              </a:rPr>
-              <a:t>barb = barbarian[-</a:t>
-            </a:r>
-            <a:r>
-              <a:rPr lang="en-US" dirty="0">
-                <a:solidFill>
-                  <a:srgbClr val="6897BB"/>
-                </a:solidFill>
-                <a:effectLst/>
-                <a:latin typeface="Consolas" panose="020B0609020204030204" pitchFamily="49" charset="0"/>
-                <a:cs typeface="Consolas" panose="020B0609020204030204" pitchFamily="49" charset="0"/>
-              </a:rPr>
-              <a:t>10</a:t>
-            </a:r>
-            <a:r>
-              <a:rPr lang="en-US" dirty="0">
-                <a:latin typeface="Consolas" panose="020B0609020204030204" pitchFamily="49" charset="0"/>
-                <a:cs typeface="Consolas" panose="020B0609020204030204" pitchFamily="49" charset="0"/>
-              </a:rPr>
-              <a:t>:]</a:t>
-            </a:r>
-            <a:br>
-              <a:rPr lang="en-US" dirty="0">
-                <a:latin typeface="Consolas" panose="020B0609020204030204" pitchFamily="49" charset="0"/>
-                <a:cs typeface="Consolas" panose="020B0609020204030204" pitchFamily="49" charset="0"/>
-              </a:rPr>
-            </a:br>
-            <a:r>
-              <a:rPr lang="en-US" dirty="0">
-                <a:solidFill>
-                  <a:srgbClr val="8888C6"/>
-                </a:solidFill>
-                <a:effectLst/>
-                <a:latin typeface="Consolas" panose="020B0609020204030204" pitchFamily="49" charset="0"/>
-                <a:cs typeface="Consolas" panose="020B0609020204030204" pitchFamily="49" charset="0"/>
-              </a:rPr>
-              <a:t>print</a:t>
-            </a:r>
-            <a:r>
-              <a:rPr lang="en-US" dirty="0">
-                <a:latin typeface="Consolas" panose="020B0609020204030204" pitchFamily="49" charset="0"/>
-                <a:cs typeface="Consolas" panose="020B0609020204030204" pitchFamily="49" charset="0"/>
-              </a:rPr>
               <a:t>(barb) </a:t>
             </a:r>
+          </a:p>
+          <a:p>
             <a:r>
               <a:rPr lang="en-US" dirty="0">
                 <a:solidFill>
@@ -14310,418 +15495,405 @@
       </p:transition>
     </mc:Fallback>
   </mc:AlternateContent>
-</p:sld>
-</file>
-
-<file path=ppt/slides/slide9.xml><?xml version="1.0" encoding="utf-8"?>
-<p:sld xmlns:a="http://schemas.openxmlformats.org/drawingml/2006/main" xmlns:r="http://schemas.openxmlformats.org/officeDocument/2006/relationships" xmlns:p="http://schemas.openxmlformats.org/presentationml/2006/main">
-  <p:cSld>
-    <p:spTree>
-      <p:nvGrpSpPr>
-        <p:cNvPr id="1" name=""/>
-        <p:cNvGrpSpPr/>
-        <p:nvPr/>
-      </p:nvGrpSpPr>
-      <p:grpSpPr>
-        <a:xfrm>
-          <a:off x="0" y="0"/>
-          <a:ext cx="0" cy="0"/>
-          <a:chOff x="0" y="0"/>
-          <a:chExt cx="0" cy="0"/>
-        </a:xfrm>
-      </p:grpSpPr>
-      <p:sp>
-        <p:nvSpPr>
-          <p:cNvPr id="2" name="Title 1">
-            <a:extLst>
-              <a:ext uri="{FF2B5EF4-FFF2-40B4-BE49-F238E27FC236}">
-                <a16:creationId xmlns:a16="http://schemas.microsoft.com/office/drawing/2014/main" id="{A4B75936-9751-C742-8F6C-BCAFDBE31A0D}"/>
-              </a:ext>
-            </a:extLst>
-          </p:cNvPr>
-          <p:cNvSpPr>
-            <a:spLocks noGrp="1"/>
-          </p:cNvSpPr>
-          <p:nvPr>
-            <p:ph type="title"/>
-          </p:nvPr>
-        </p:nvSpPr>
-        <p:spPr/>
-        <p:txBody>
-          <a:bodyPr/>
-          <a:lstStyle/>
-          <a:p>
-            <a:r>
-              <a:rPr lang="en-US" dirty="0"/>
-              <a:t>String Methods</a:t>
-            </a:r>
-          </a:p>
-        </p:txBody>
-      </p:sp>
-      <p:sp>
-        <p:nvSpPr>
-          <p:cNvPr id="3" name="Text Placeholder 2">
-            <a:extLst>
-              <a:ext uri="{FF2B5EF4-FFF2-40B4-BE49-F238E27FC236}">
-                <a16:creationId xmlns:a16="http://schemas.microsoft.com/office/drawing/2014/main" id="{FCBE4F2A-25A2-374F-9179-7E17A4F72019}"/>
-              </a:ext>
-            </a:extLst>
-          </p:cNvPr>
-          <p:cNvSpPr>
-            <a:spLocks noGrp="1"/>
-          </p:cNvSpPr>
-          <p:nvPr>
-            <p:ph type="body" sz="quarter" idx="10"/>
-          </p:nvPr>
-        </p:nvSpPr>
-        <p:spPr>
-          <a:xfrm>
-            <a:off x="677337" y="1675083"/>
-            <a:ext cx="6558842" cy="4888774"/>
-          </a:xfrm>
-        </p:spPr>
-        <p:txBody>
-          <a:bodyPr/>
-          <a:lstStyle/>
-          <a:p>
-            <a:r>
-              <a:rPr lang="en-US" dirty="0"/>
-              <a:t>replace(old, new)</a:t>
-            </a:r>
-          </a:p>
-          <a:p>
-            <a:pPr lvl="1"/>
-            <a:r>
-              <a:rPr lang="en-US" dirty="0"/>
-              <a:t>replace(old, new, count)</a:t>
-            </a:r>
-          </a:p>
-          <a:p>
-            <a:r>
-              <a:rPr lang="en-US" dirty="0"/>
-              <a:t>find(x) </a:t>
-            </a:r>
-          </a:p>
-          <a:p>
-            <a:pPr lvl="1"/>
-            <a:r>
-              <a:rPr lang="en-US" dirty="0"/>
-              <a:t>find(x, start)</a:t>
-            </a:r>
-          </a:p>
-          <a:p>
-            <a:pPr lvl="1"/>
-            <a:r>
-              <a:rPr lang="en-US" dirty="0"/>
-              <a:t>find(x, start, end)</a:t>
-            </a:r>
-          </a:p>
-          <a:p>
-            <a:pPr lvl="1"/>
-            <a:r>
-              <a:rPr lang="en-US" dirty="0" err="1"/>
-              <a:t>rfind</a:t>
-            </a:r>
-            <a:r>
-              <a:rPr lang="en-US" dirty="0"/>
-              <a:t>(x)</a:t>
-            </a:r>
-          </a:p>
-          <a:p>
-            <a:r>
-              <a:rPr lang="en-US" dirty="0"/>
-              <a:t>count(x) </a:t>
-            </a:r>
-          </a:p>
-          <a:p>
-            <a:r>
-              <a:rPr lang="en-US" dirty="0" err="1"/>
-              <a:t>isalnum</a:t>
-            </a:r>
-            <a:r>
-              <a:rPr lang="en-US" dirty="0"/>
-              <a:t>()  - no specials  or </a:t>
-            </a:r>
-            <a:r>
-              <a:rPr lang="en-US" dirty="0" err="1"/>
-              <a:t>puncuation</a:t>
-            </a:r>
-            <a:endParaRPr lang="en-US" dirty="0"/>
-          </a:p>
-          <a:p>
-            <a:r>
-              <a:rPr lang="en-US" dirty="0"/>
-              <a:t>lower() – change all to lowercase</a:t>
-            </a:r>
-          </a:p>
-          <a:p>
-            <a:r>
-              <a:rPr lang="en-US" dirty="0"/>
-              <a:t>upper() – change all to uppercase</a:t>
-            </a:r>
-          </a:p>
-          <a:p>
-            <a:r>
-              <a:rPr lang="en-US" dirty="0"/>
-              <a:t>strip() – remove training and leading spaces</a:t>
-            </a:r>
-          </a:p>
-        </p:txBody>
-      </p:sp>
-      <p:sp>
-        <p:nvSpPr>
-          <p:cNvPr id="4" name="Text Placeholder 2">
-            <a:extLst>
-              <a:ext uri="{FF2B5EF4-FFF2-40B4-BE49-F238E27FC236}">
-                <a16:creationId xmlns:a16="http://schemas.microsoft.com/office/drawing/2014/main" id="{5DCC2943-EF66-6848-8EA9-A601B82ECB82}"/>
-              </a:ext>
-            </a:extLst>
-          </p:cNvPr>
-          <p:cNvSpPr txBox="1">
-            <a:spLocks/>
-          </p:cNvSpPr>
-          <p:nvPr/>
-        </p:nvSpPr>
-        <p:spPr>
-          <a:xfrm>
-            <a:off x="7236179" y="1463722"/>
-            <a:ext cx="5953346" cy="2316596"/>
-          </a:xfrm>
-          <a:prstGeom prst="rect">
-            <a:avLst/>
-          </a:prstGeom>
-        </p:spPr>
-        <p:txBody>
-          <a:bodyPr vert="horz" wrap="square" lIns="91440" tIns="91440" rIns="91440" bIns="91440" rtlCol="0">
-            <a:spAutoFit/>
-          </a:bodyPr>
-          <a:lstStyle>
-            <a:lvl1pPr marL="524712" indent="-524712" algn="l" defTabSz="699614" rtl="0" eaLnBrk="1" latinLnBrk="0" hangingPunct="1">
-              <a:lnSpc>
-                <a:spcPct val="120000"/>
-              </a:lnSpc>
-              <a:spcBef>
-                <a:spcPts val="600"/>
-              </a:spcBef>
-              <a:spcAft>
-                <a:spcPts val="600"/>
-              </a:spcAft>
-              <a:buFont typeface="Arial"/>
-              <a:buChar char="•"/>
-              <a:defRPr sz="1800" b="0" i="0" kern="1200">
-                <a:solidFill>
-                  <a:srgbClr val="092529"/>
-                </a:solidFill>
-                <a:latin typeface="Proxima Nova" charset="0"/>
-                <a:ea typeface="Proxima Nova" charset="0"/>
-                <a:cs typeface="Proxima Nova" charset="0"/>
-              </a:defRPr>
-            </a:lvl1pPr>
-            <a:lvl2pPr marL="1136875" indent="-437261" algn="l" defTabSz="699614" rtl="0" eaLnBrk="1" latinLnBrk="0" hangingPunct="1">
-              <a:lnSpc>
-                <a:spcPct val="120000"/>
-              </a:lnSpc>
-              <a:spcBef>
-                <a:spcPts val="0"/>
-              </a:spcBef>
-              <a:spcAft>
-                <a:spcPts val="600"/>
-              </a:spcAft>
-              <a:buFont typeface="Arial"/>
-              <a:buChar char="–"/>
-              <a:defRPr sz="1600" b="0" i="0" kern="1200">
-                <a:solidFill>
-                  <a:srgbClr val="092529"/>
-                </a:solidFill>
-                <a:latin typeface="Proxima Nova" charset="0"/>
-                <a:ea typeface="Proxima Nova" charset="0"/>
-                <a:cs typeface="Proxima Nova" charset="0"/>
-              </a:defRPr>
-            </a:lvl2pPr>
-            <a:lvl3pPr marL="1749040" indent="-349807" algn="l" defTabSz="699614" rtl="0" eaLnBrk="1" latinLnBrk="0" hangingPunct="1">
-              <a:lnSpc>
-                <a:spcPct val="120000"/>
-              </a:lnSpc>
-              <a:spcBef>
-                <a:spcPts val="0"/>
-              </a:spcBef>
-              <a:spcAft>
-                <a:spcPts val="600"/>
-              </a:spcAft>
-              <a:buFont typeface="Arial"/>
-              <a:buChar char="•"/>
-              <a:defRPr sz="1600" b="0" i="0" kern="1200">
-                <a:solidFill>
-                  <a:srgbClr val="092529"/>
-                </a:solidFill>
-                <a:latin typeface="Proxima Nova" charset="0"/>
-                <a:ea typeface="Proxima Nova" charset="0"/>
-                <a:cs typeface="Proxima Nova" charset="0"/>
-              </a:defRPr>
-            </a:lvl3pPr>
-            <a:lvl4pPr marL="2448655" indent="-349807" algn="l" defTabSz="699614" rtl="0" eaLnBrk="1" latinLnBrk="0" hangingPunct="1">
-              <a:lnSpc>
-                <a:spcPct val="120000"/>
-              </a:lnSpc>
-              <a:spcBef>
-                <a:spcPts val="0"/>
-              </a:spcBef>
-              <a:spcAft>
-                <a:spcPts val="600"/>
-              </a:spcAft>
-              <a:buFont typeface="Arial"/>
-              <a:buChar char="–"/>
-              <a:defRPr sz="1600" b="0" i="0" kern="1200">
-                <a:solidFill>
-                  <a:srgbClr val="092529"/>
-                </a:solidFill>
-                <a:latin typeface="Proxima Nova" charset="0"/>
-                <a:ea typeface="Proxima Nova" charset="0"/>
-                <a:cs typeface="Proxima Nova" charset="0"/>
-              </a:defRPr>
-            </a:lvl4pPr>
-            <a:lvl5pPr marL="3148272" indent="-349807" algn="l" defTabSz="699614" rtl="0" eaLnBrk="1" latinLnBrk="0" hangingPunct="1">
-              <a:spcBef>
-                <a:spcPct val="20000"/>
-              </a:spcBef>
-              <a:buFont typeface="Arial"/>
-              <a:buChar char="»"/>
-              <a:defRPr sz="1648" b="0" kern="1200">
-                <a:solidFill>
-                  <a:srgbClr val="092529"/>
-                </a:solidFill>
-                <a:latin typeface="Franklin Gothic Book" charset="0"/>
-                <a:ea typeface="Franklin Gothic Book" charset="0"/>
-                <a:cs typeface="Franklin Gothic Book" charset="0"/>
-              </a:defRPr>
-            </a:lvl5pPr>
-            <a:lvl6pPr marL="3847888" indent="-349807" algn="l" defTabSz="699614" rtl="0" eaLnBrk="1" latinLnBrk="0" hangingPunct="1">
-              <a:spcBef>
-                <a:spcPct val="20000"/>
-              </a:spcBef>
-              <a:buFont typeface="Arial"/>
-              <a:buChar char="•"/>
-              <a:defRPr sz="3022" kern="1200">
-                <a:solidFill>
-                  <a:schemeClr val="tx1"/>
-                </a:solidFill>
-                <a:latin typeface="+mn-lt"/>
-                <a:ea typeface="+mn-ea"/>
-                <a:cs typeface="+mn-cs"/>
-              </a:defRPr>
-            </a:lvl6pPr>
-            <a:lvl7pPr marL="4547505" indent="-349807" algn="l" defTabSz="699614" rtl="0" eaLnBrk="1" latinLnBrk="0" hangingPunct="1">
-              <a:spcBef>
-                <a:spcPct val="20000"/>
-              </a:spcBef>
-              <a:buFont typeface="Arial"/>
-              <a:buChar char="•"/>
-              <a:defRPr sz="3022" kern="1200">
-                <a:solidFill>
-                  <a:schemeClr val="tx1"/>
-                </a:solidFill>
-                <a:latin typeface="+mn-lt"/>
-                <a:ea typeface="+mn-ea"/>
-                <a:cs typeface="+mn-cs"/>
-              </a:defRPr>
-            </a:lvl7pPr>
-            <a:lvl8pPr marL="5247119" indent="-349807" algn="l" defTabSz="699614" rtl="0" eaLnBrk="1" latinLnBrk="0" hangingPunct="1">
-              <a:spcBef>
-                <a:spcPct val="20000"/>
-              </a:spcBef>
-              <a:buFont typeface="Arial"/>
-              <a:buChar char="•"/>
-              <a:defRPr sz="3022" kern="1200">
-                <a:solidFill>
-                  <a:schemeClr val="tx1"/>
-                </a:solidFill>
-                <a:latin typeface="+mn-lt"/>
-                <a:ea typeface="+mn-ea"/>
-                <a:cs typeface="+mn-cs"/>
-              </a:defRPr>
-            </a:lvl8pPr>
-            <a:lvl9pPr marL="5946736" indent="-349807" algn="l" defTabSz="699614" rtl="0" eaLnBrk="1" latinLnBrk="0" hangingPunct="1">
-              <a:spcBef>
-                <a:spcPct val="20000"/>
-              </a:spcBef>
-              <a:buFont typeface="Arial"/>
-              <a:buChar char="•"/>
-              <a:defRPr sz="3022" kern="1200">
-                <a:solidFill>
-                  <a:schemeClr val="tx1"/>
-                </a:solidFill>
-                <a:latin typeface="+mn-lt"/>
-                <a:ea typeface="+mn-ea"/>
-                <a:cs typeface="+mn-cs"/>
-              </a:defRPr>
-            </a:lvl9pPr>
-          </a:lstStyle>
-          <a:p>
-            <a:pPr marL="0" indent="0">
-              <a:buNone/>
-            </a:pPr>
-            <a:r>
-              <a:rPr lang="en-US" dirty="0"/>
-              <a:t>Conditional Operators and Strings</a:t>
-            </a:r>
-          </a:p>
-          <a:p>
-            <a:r>
-              <a:rPr lang="en-US" dirty="0"/>
-              <a:t>== - both are equal –  including case</a:t>
-            </a:r>
-          </a:p>
-          <a:p>
-            <a:r>
-              <a:rPr lang="en-US" dirty="0"/>
-              <a:t>&gt; - letter by letter comparison</a:t>
-            </a:r>
-          </a:p>
-          <a:p>
-            <a:r>
-              <a:rPr lang="en-US" dirty="0"/>
-              <a:t>string </a:t>
-            </a:r>
-            <a:r>
-              <a:rPr lang="en-US" b="1" dirty="0"/>
-              <a:t>in</a:t>
-            </a:r>
-            <a:r>
-              <a:rPr lang="en-US" dirty="0"/>
-              <a:t> string – in operator </a:t>
-            </a:r>
-          </a:p>
-          <a:p>
-            <a:pPr lvl="1"/>
-            <a:r>
-              <a:rPr lang="en-US" dirty="0"/>
-              <a:t>works with lists/tuples </a:t>
-            </a:r>
-          </a:p>
-        </p:txBody>
-      </p:sp>
-    </p:spTree>
-    <p:extLst>
-      <p:ext uri="{BB962C8B-B14F-4D97-AF65-F5344CB8AC3E}">
-        <p14:creationId xmlns:p14="http://schemas.microsoft.com/office/powerpoint/2010/main" val="316372104"/>
-      </p:ext>
-    </p:extLst>
-  </p:cSld>
-  <p:clrMapOvr>
-    <a:masterClrMapping/>
-  </p:clrMapOvr>
-  <mc:AlternateContent xmlns:mc="http://schemas.openxmlformats.org/markup-compatibility/2006" xmlns:p14="http://schemas.microsoft.com/office/powerpoint/2010/main">
-    <mc:Choice Requires="p14">
-      <p:transition p14:dur="300">
-        <p:fade/>
-      </p:transition>
-    </mc:Choice>
-    <mc:Fallback xmlns="">
-      <p:transition>
-        <p:fade/>
-      </p:transition>
-    </mc:Fallback>
-  </mc:AlternateContent>
+  <p:timing>
+    <p:tnLst>
+      <p:par>
+        <p:cTn id="1" dur="indefinite" restart="never" nodeType="tmRoot">
+          <p:childTnLst>
+            <p:seq concurrent="1" nextAc="seek">
+              <p:cTn id="2" dur="indefinite" nodeType="mainSeq">
+                <p:childTnLst>
+                  <p:par>
+                    <p:cTn id="3" fill="hold">
+                      <p:stCondLst>
+                        <p:cond delay="indefinite"/>
+                      </p:stCondLst>
+                      <p:childTnLst>
+                        <p:par>
+                          <p:cTn id="4" fill="hold">
+                            <p:stCondLst>
+                              <p:cond delay="0"/>
+                            </p:stCondLst>
+                            <p:childTnLst>
+                              <p:par>
+                                <p:cTn id="5" presetID="10" presetClass="entr" presetSubtype="0" fill="hold" grpId="0" nodeType="clickEffect">
+                                  <p:stCondLst>
+                                    <p:cond delay="0"/>
+                                  </p:stCondLst>
+                                  <p:childTnLst>
+                                    <p:set>
+                                      <p:cBhvr>
+                                        <p:cTn id="6" dur="1" fill="hold">
+                                          <p:stCondLst>
+                                            <p:cond delay="0"/>
+                                          </p:stCondLst>
+                                        </p:cTn>
+                                        <p:tgtEl>
+                                          <p:spTgt spid="7">
+                                            <p:txEl>
+                                              <p:pRg st="0" end="0"/>
+                                            </p:txEl>
+                                          </p:spTgt>
+                                        </p:tgtEl>
+                                        <p:attrNameLst>
+                                          <p:attrName>style.visibility</p:attrName>
+                                        </p:attrNameLst>
+                                      </p:cBhvr>
+                                      <p:to>
+                                        <p:strVal val="visible"/>
+                                      </p:to>
+                                    </p:set>
+                                    <p:animEffect transition="in" filter="fade">
+                                      <p:cBhvr>
+                                        <p:cTn id="7" dur="500"/>
+                                        <p:tgtEl>
+                                          <p:spTgt spid="7">
+                                            <p:txEl>
+                                              <p:pRg st="0" end="0"/>
+                                            </p:txEl>
+                                          </p:spTgt>
+                                        </p:tgtEl>
+                                      </p:cBhvr>
+                                    </p:animEffect>
+                                  </p:childTnLst>
+                                </p:cTn>
+                              </p:par>
+                            </p:childTnLst>
+                          </p:cTn>
+                        </p:par>
+                      </p:childTnLst>
+                    </p:cTn>
+                  </p:par>
+                  <p:par>
+                    <p:cTn id="8" fill="hold">
+                      <p:stCondLst>
+                        <p:cond delay="indefinite"/>
+                      </p:stCondLst>
+                      <p:childTnLst>
+                        <p:par>
+                          <p:cTn id="9" fill="hold">
+                            <p:stCondLst>
+                              <p:cond delay="0"/>
+                            </p:stCondLst>
+                            <p:childTnLst>
+                              <p:par>
+                                <p:cTn id="10" presetID="10" presetClass="entr" presetSubtype="0" fill="hold" grpId="0" nodeType="clickEffect">
+                                  <p:stCondLst>
+                                    <p:cond delay="0"/>
+                                  </p:stCondLst>
+                                  <p:childTnLst>
+                                    <p:set>
+                                      <p:cBhvr>
+                                        <p:cTn id="11" dur="1" fill="hold">
+                                          <p:stCondLst>
+                                            <p:cond delay="0"/>
+                                          </p:stCondLst>
+                                        </p:cTn>
+                                        <p:tgtEl>
+                                          <p:spTgt spid="7">
+                                            <p:txEl>
+                                              <p:pRg st="1" end="1"/>
+                                            </p:txEl>
+                                          </p:spTgt>
+                                        </p:tgtEl>
+                                        <p:attrNameLst>
+                                          <p:attrName>style.visibility</p:attrName>
+                                        </p:attrNameLst>
+                                      </p:cBhvr>
+                                      <p:to>
+                                        <p:strVal val="visible"/>
+                                      </p:to>
+                                    </p:set>
+                                    <p:animEffect transition="in" filter="fade">
+                                      <p:cBhvr>
+                                        <p:cTn id="12" dur="500"/>
+                                        <p:tgtEl>
+                                          <p:spTgt spid="7">
+                                            <p:txEl>
+                                              <p:pRg st="1" end="1"/>
+                                            </p:txEl>
+                                          </p:spTgt>
+                                        </p:tgtEl>
+                                      </p:cBhvr>
+                                    </p:animEffect>
+                                  </p:childTnLst>
+                                </p:cTn>
+                              </p:par>
+                            </p:childTnLst>
+                          </p:cTn>
+                        </p:par>
+                      </p:childTnLst>
+                    </p:cTn>
+                  </p:par>
+                  <p:par>
+                    <p:cTn id="13" fill="hold">
+                      <p:stCondLst>
+                        <p:cond delay="indefinite"/>
+                      </p:stCondLst>
+                      <p:childTnLst>
+                        <p:par>
+                          <p:cTn id="14" fill="hold">
+                            <p:stCondLst>
+                              <p:cond delay="0"/>
+                            </p:stCondLst>
+                            <p:childTnLst>
+                              <p:par>
+                                <p:cTn id="15" presetID="10" presetClass="entr" presetSubtype="0" fill="hold" grpId="0" nodeType="clickEffect">
+                                  <p:stCondLst>
+                                    <p:cond delay="0"/>
+                                  </p:stCondLst>
+                                  <p:childTnLst>
+                                    <p:set>
+                                      <p:cBhvr>
+                                        <p:cTn id="16" dur="1" fill="hold">
+                                          <p:stCondLst>
+                                            <p:cond delay="0"/>
+                                          </p:stCondLst>
+                                        </p:cTn>
+                                        <p:tgtEl>
+                                          <p:spTgt spid="7">
+                                            <p:txEl>
+                                              <p:pRg st="2" end="2"/>
+                                            </p:txEl>
+                                          </p:spTgt>
+                                        </p:tgtEl>
+                                        <p:attrNameLst>
+                                          <p:attrName>style.visibility</p:attrName>
+                                        </p:attrNameLst>
+                                      </p:cBhvr>
+                                      <p:to>
+                                        <p:strVal val="visible"/>
+                                      </p:to>
+                                    </p:set>
+                                    <p:animEffect transition="in" filter="fade">
+                                      <p:cBhvr>
+                                        <p:cTn id="17" dur="500"/>
+                                        <p:tgtEl>
+                                          <p:spTgt spid="7">
+                                            <p:txEl>
+                                              <p:pRg st="2" end="2"/>
+                                            </p:txEl>
+                                          </p:spTgt>
+                                        </p:tgtEl>
+                                      </p:cBhvr>
+                                    </p:animEffect>
+                                  </p:childTnLst>
+                                </p:cTn>
+                              </p:par>
+                            </p:childTnLst>
+                          </p:cTn>
+                        </p:par>
+                      </p:childTnLst>
+                    </p:cTn>
+                  </p:par>
+                  <p:par>
+                    <p:cTn id="18" fill="hold">
+                      <p:stCondLst>
+                        <p:cond delay="indefinite"/>
+                      </p:stCondLst>
+                      <p:childTnLst>
+                        <p:par>
+                          <p:cTn id="19" fill="hold">
+                            <p:stCondLst>
+                              <p:cond delay="0"/>
+                            </p:stCondLst>
+                            <p:childTnLst>
+                              <p:par>
+                                <p:cTn id="20" presetID="10" presetClass="entr" presetSubtype="0" fill="hold" grpId="0" nodeType="clickEffect">
+                                  <p:stCondLst>
+                                    <p:cond delay="0"/>
+                                  </p:stCondLst>
+                                  <p:childTnLst>
+                                    <p:set>
+                                      <p:cBhvr>
+                                        <p:cTn id="21" dur="1" fill="hold">
+                                          <p:stCondLst>
+                                            <p:cond delay="0"/>
+                                          </p:stCondLst>
+                                        </p:cTn>
+                                        <p:tgtEl>
+                                          <p:spTgt spid="7">
+                                            <p:txEl>
+                                              <p:pRg st="3" end="3"/>
+                                            </p:txEl>
+                                          </p:spTgt>
+                                        </p:tgtEl>
+                                        <p:attrNameLst>
+                                          <p:attrName>style.visibility</p:attrName>
+                                        </p:attrNameLst>
+                                      </p:cBhvr>
+                                      <p:to>
+                                        <p:strVal val="visible"/>
+                                      </p:to>
+                                    </p:set>
+                                    <p:animEffect transition="in" filter="fade">
+                                      <p:cBhvr>
+                                        <p:cTn id="22" dur="500"/>
+                                        <p:tgtEl>
+                                          <p:spTgt spid="7">
+                                            <p:txEl>
+                                              <p:pRg st="3" end="3"/>
+                                            </p:txEl>
+                                          </p:spTgt>
+                                        </p:tgtEl>
+                                      </p:cBhvr>
+                                    </p:animEffect>
+                                  </p:childTnLst>
+                                </p:cTn>
+                              </p:par>
+                            </p:childTnLst>
+                          </p:cTn>
+                        </p:par>
+                      </p:childTnLst>
+                    </p:cTn>
+                  </p:par>
+                  <p:par>
+                    <p:cTn id="23" fill="hold">
+                      <p:stCondLst>
+                        <p:cond delay="indefinite"/>
+                      </p:stCondLst>
+                      <p:childTnLst>
+                        <p:par>
+                          <p:cTn id="24" fill="hold">
+                            <p:stCondLst>
+                              <p:cond delay="0"/>
+                            </p:stCondLst>
+                            <p:childTnLst>
+                              <p:par>
+                                <p:cTn id="25" presetID="10" presetClass="entr" presetSubtype="0" fill="hold" grpId="0" nodeType="clickEffect">
+                                  <p:stCondLst>
+                                    <p:cond delay="0"/>
+                                  </p:stCondLst>
+                                  <p:childTnLst>
+                                    <p:set>
+                                      <p:cBhvr>
+                                        <p:cTn id="26" dur="1" fill="hold">
+                                          <p:stCondLst>
+                                            <p:cond delay="0"/>
+                                          </p:stCondLst>
+                                        </p:cTn>
+                                        <p:tgtEl>
+                                          <p:spTgt spid="7">
+                                            <p:txEl>
+                                              <p:pRg st="4" end="4"/>
+                                            </p:txEl>
+                                          </p:spTgt>
+                                        </p:tgtEl>
+                                        <p:attrNameLst>
+                                          <p:attrName>style.visibility</p:attrName>
+                                        </p:attrNameLst>
+                                      </p:cBhvr>
+                                      <p:to>
+                                        <p:strVal val="visible"/>
+                                      </p:to>
+                                    </p:set>
+                                    <p:animEffect transition="in" filter="fade">
+                                      <p:cBhvr>
+                                        <p:cTn id="27" dur="500"/>
+                                        <p:tgtEl>
+                                          <p:spTgt spid="7">
+                                            <p:txEl>
+                                              <p:pRg st="4" end="4"/>
+                                            </p:txEl>
+                                          </p:spTgt>
+                                        </p:tgtEl>
+                                      </p:cBhvr>
+                                    </p:animEffect>
+                                  </p:childTnLst>
+                                </p:cTn>
+                              </p:par>
+                            </p:childTnLst>
+                          </p:cTn>
+                        </p:par>
+                      </p:childTnLst>
+                    </p:cTn>
+                  </p:par>
+                  <p:par>
+                    <p:cTn id="28" fill="hold">
+                      <p:stCondLst>
+                        <p:cond delay="indefinite"/>
+                      </p:stCondLst>
+                      <p:childTnLst>
+                        <p:par>
+                          <p:cTn id="29" fill="hold">
+                            <p:stCondLst>
+                              <p:cond delay="0"/>
+                            </p:stCondLst>
+                            <p:childTnLst>
+                              <p:par>
+                                <p:cTn id="30" presetID="10" presetClass="entr" presetSubtype="0" fill="hold" grpId="0" nodeType="clickEffect">
+                                  <p:stCondLst>
+                                    <p:cond delay="0"/>
+                                  </p:stCondLst>
+                                  <p:childTnLst>
+                                    <p:set>
+                                      <p:cBhvr>
+                                        <p:cTn id="31" dur="1" fill="hold">
+                                          <p:stCondLst>
+                                            <p:cond delay="0"/>
+                                          </p:stCondLst>
+                                        </p:cTn>
+                                        <p:tgtEl>
+                                          <p:spTgt spid="7">
+                                            <p:txEl>
+                                              <p:pRg st="5" end="5"/>
+                                            </p:txEl>
+                                          </p:spTgt>
+                                        </p:tgtEl>
+                                        <p:attrNameLst>
+                                          <p:attrName>style.visibility</p:attrName>
+                                        </p:attrNameLst>
+                                      </p:cBhvr>
+                                      <p:to>
+                                        <p:strVal val="visible"/>
+                                      </p:to>
+                                    </p:set>
+                                    <p:animEffect transition="in" filter="fade">
+                                      <p:cBhvr>
+                                        <p:cTn id="32" dur="500"/>
+                                        <p:tgtEl>
+                                          <p:spTgt spid="7">
+                                            <p:txEl>
+                                              <p:pRg st="5" end="5"/>
+                                            </p:txEl>
+                                          </p:spTgt>
+                                        </p:tgtEl>
+                                      </p:cBhvr>
+                                    </p:animEffect>
+                                  </p:childTnLst>
+                                </p:cTn>
+                              </p:par>
+                            </p:childTnLst>
+                          </p:cTn>
+                        </p:par>
+                      </p:childTnLst>
+                    </p:cTn>
+                  </p:par>
+                </p:childTnLst>
+              </p:cTn>
+              <p:prevCondLst>
+                <p:cond evt="onPrev" delay="0">
+                  <p:tgtEl>
+                    <p:sldTgt/>
+                  </p:tgtEl>
+                </p:cond>
+              </p:prevCondLst>
+              <p:nextCondLst>
+                <p:cond evt="onNext" delay="0">
+                  <p:tgtEl>
+                    <p:sldTgt/>
+                  </p:tgtEl>
+                </p:cond>
+              </p:nextCondLst>
+            </p:seq>
+          </p:childTnLst>
+        </p:cTn>
+      </p:par>
+    </p:tnLst>
+    <p:bldLst>
+      <p:bldP spid="7" grpId="0" build="p" bldLvl="2"/>
+    </p:bldLst>
+  </p:timing>
 </p:sld>
 </file>
 

</xml_diff>